<commit_message>
Some changes in documentation
</commit_message>
<xml_diff>
--- a/Documentation/Issue_to_Impact.pptx
+++ b/Documentation/Issue_to_Impact.pptx
@@ -3,10 +3,9 @@
 <p:presentation xmlns:a="http://schemas.openxmlformats.org/drawingml/2006/main" xmlns:p="http://schemas.openxmlformats.org/presentationml/2006/main" xmlns:r="http://schemas.openxmlformats.org/officeDocument/2006/relationships" xmlns:p14="http://schemas.microsoft.com/office/powerpoint/2010/main" xmlns:p15="http://schemas.microsoft.com/office/powerpoint/2012/main" xmlns:mc="http://schemas.openxmlformats.org/markup-compatibility/2006">
   <p:sldMasterIdLst>
     <p:sldMasterId id="2147483648" r:id="rId2"/>
-    <p:sldMasterId id="2147483661" r:id="rId3"/>
   </p:sldMasterIdLst>
   <p:sldIdLst>
-    <p:sldId id="256" r:id="rId4"/>
+    <p:sldId id="256" r:id="rId3"/>
   </p:sldIdLst>
   <p:sldSz cx="12192000" cy="6858000"/>
   <p:notesSz cx="7559675" cy="10691812"/>
@@ -54,7 +53,7 @@
       </p:grpSpPr>
       <p:sp>
         <p:nvSpPr>
-          <p:cNvPr id="26" name="PlaceHolder 1"/>
+          <p:cNvPr id="22" name="PlaceHolder 1"/>
           <p:cNvSpPr>
             <a:spLocks noGrp="1"/>
           </p:cNvSpPr>
@@ -65,7 +64,7 @@
         <p:spPr>
           <a:xfrm>
             <a:off x="1523880" y="1122480"/>
-            <a:ext cx="9143640" cy="2387160"/>
+            <a:ext cx="9143280" cy="2386800"/>
           </a:xfrm>
           <a:prstGeom prst="rect">
             <a:avLst/>
@@ -74,18 +73,16 @@
         <p:txBody>
           <a:bodyPr lIns="0" rIns="0" tIns="0" bIns="0" anchor="ctr"/>
           <a:p>
-            <a:endParaRPr b="0" lang="en-US" sz="1800" spc="-1" strike="noStrike">
-              <a:solidFill>
-                <a:srgbClr val="000000"/>
-              </a:solidFill>
-              <a:latin typeface="Calibri"/>
+            <a:pPr algn="ctr"/>
+            <a:endParaRPr b="0" lang="en-IN" sz="4400" spc="-1" strike="noStrike">
+              <a:latin typeface="Arial"/>
             </a:endParaRPr>
           </a:p>
         </p:txBody>
       </p:sp>
       <p:sp>
         <p:nvSpPr>
-          <p:cNvPr id="27" name="PlaceHolder 2"/>
+          <p:cNvPr id="23" name="PlaceHolder 2"/>
           <p:cNvSpPr>
             <a:spLocks noGrp="1"/>
           </p:cNvSpPr>
@@ -107,18 +104,15 @@
             <a:normAutofit/>
           </a:bodyPr>
           <a:p>
-            <a:endParaRPr b="0" lang="en-US" sz="2800" spc="-1" strike="noStrike">
-              <a:solidFill>
-                <a:srgbClr val="000000"/>
-              </a:solidFill>
-              <a:latin typeface="Calibri"/>
+            <a:endParaRPr b="0" lang="en-IN" sz="3200" spc="-1" strike="noStrike">
+              <a:latin typeface="Arial"/>
             </a:endParaRPr>
           </a:p>
         </p:txBody>
       </p:sp>
       <p:sp>
         <p:nvSpPr>
-          <p:cNvPr id="28" name="PlaceHolder 3"/>
+          <p:cNvPr id="24" name="PlaceHolder 3"/>
           <p:cNvSpPr>
             <a:spLocks noGrp="1"/>
           </p:cNvSpPr>
@@ -140,11 +134,8 @@
             <a:normAutofit/>
           </a:bodyPr>
           <a:p>
-            <a:endParaRPr b="0" lang="en-US" sz="2800" spc="-1" strike="noStrike">
-              <a:solidFill>
-                <a:srgbClr val="000000"/>
-              </a:solidFill>
-              <a:latin typeface="Calibri"/>
+            <a:endParaRPr b="0" lang="en-IN" sz="3200" spc="-1" strike="noStrike">
+              <a:latin typeface="Arial"/>
             </a:endParaRPr>
           </a:p>
         </p:txBody>
@@ -173,7 +164,7 @@
       </p:grpSpPr>
       <p:sp>
         <p:nvSpPr>
-          <p:cNvPr id="29" name="PlaceHolder 1"/>
+          <p:cNvPr id="25" name="PlaceHolder 1"/>
           <p:cNvSpPr>
             <a:spLocks noGrp="1"/>
           </p:cNvSpPr>
@@ -184,7 +175,7 @@
         <p:spPr>
           <a:xfrm>
             <a:off x="1523880" y="1122480"/>
-            <a:ext cx="9143640" cy="2387160"/>
+            <a:ext cx="9143280" cy="2386800"/>
           </a:xfrm>
           <a:prstGeom prst="rect">
             <a:avLst/>
@@ -193,18 +184,16 @@
         <p:txBody>
           <a:bodyPr lIns="0" rIns="0" tIns="0" bIns="0" anchor="ctr"/>
           <a:p>
-            <a:endParaRPr b="0" lang="en-US" sz="1800" spc="-1" strike="noStrike">
-              <a:solidFill>
-                <a:srgbClr val="000000"/>
-              </a:solidFill>
-              <a:latin typeface="Calibri"/>
+            <a:pPr algn="ctr"/>
+            <a:endParaRPr b="0" lang="en-IN" sz="4400" spc="-1" strike="noStrike">
+              <a:latin typeface="Arial"/>
             </a:endParaRPr>
           </a:p>
         </p:txBody>
       </p:sp>
       <p:sp>
         <p:nvSpPr>
-          <p:cNvPr id="30" name="PlaceHolder 2"/>
+          <p:cNvPr id="26" name="PlaceHolder 2"/>
           <p:cNvSpPr>
             <a:spLocks noGrp="1"/>
           </p:cNvSpPr>
@@ -226,18 +215,15 @@
             <a:normAutofit/>
           </a:bodyPr>
           <a:p>
-            <a:endParaRPr b="0" lang="en-US" sz="2800" spc="-1" strike="noStrike">
-              <a:solidFill>
-                <a:srgbClr val="000000"/>
-              </a:solidFill>
-              <a:latin typeface="Calibri"/>
+            <a:endParaRPr b="0" lang="en-IN" sz="3200" spc="-1" strike="noStrike">
+              <a:latin typeface="Arial"/>
             </a:endParaRPr>
           </a:p>
         </p:txBody>
       </p:sp>
       <p:sp>
         <p:nvSpPr>
-          <p:cNvPr id="31" name="PlaceHolder 3"/>
+          <p:cNvPr id="27" name="PlaceHolder 3"/>
           <p:cNvSpPr>
             <a:spLocks noGrp="1"/>
           </p:cNvSpPr>
@@ -259,18 +245,15 @@
             <a:normAutofit/>
           </a:bodyPr>
           <a:p>
-            <a:endParaRPr b="0" lang="en-US" sz="2800" spc="-1" strike="noStrike">
-              <a:solidFill>
-                <a:srgbClr val="000000"/>
-              </a:solidFill>
-              <a:latin typeface="Calibri"/>
+            <a:endParaRPr b="0" lang="en-IN" sz="3200" spc="-1" strike="noStrike">
+              <a:latin typeface="Arial"/>
             </a:endParaRPr>
           </a:p>
         </p:txBody>
       </p:sp>
       <p:sp>
         <p:nvSpPr>
-          <p:cNvPr id="32" name="PlaceHolder 4"/>
+          <p:cNvPr id="28" name="PlaceHolder 4"/>
           <p:cNvSpPr>
             <a:spLocks noGrp="1"/>
           </p:cNvSpPr>
@@ -292,18 +275,15 @@
             <a:normAutofit/>
           </a:bodyPr>
           <a:p>
-            <a:endParaRPr b="0" lang="en-US" sz="2800" spc="-1" strike="noStrike">
-              <a:solidFill>
-                <a:srgbClr val="000000"/>
-              </a:solidFill>
-              <a:latin typeface="Calibri"/>
+            <a:endParaRPr b="0" lang="en-IN" sz="3200" spc="-1" strike="noStrike">
+              <a:latin typeface="Arial"/>
             </a:endParaRPr>
           </a:p>
         </p:txBody>
       </p:sp>
       <p:sp>
         <p:nvSpPr>
-          <p:cNvPr id="33" name="PlaceHolder 5"/>
+          <p:cNvPr id="29" name="PlaceHolder 5"/>
           <p:cNvSpPr>
             <a:spLocks noGrp="1"/>
           </p:cNvSpPr>
@@ -325,11 +305,8 @@
             <a:normAutofit/>
           </a:bodyPr>
           <a:p>
-            <a:endParaRPr b="0" lang="en-US" sz="2800" spc="-1" strike="noStrike">
-              <a:solidFill>
-                <a:srgbClr val="000000"/>
-              </a:solidFill>
-              <a:latin typeface="Calibri"/>
+            <a:endParaRPr b="0" lang="en-IN" sz="3200" spc="-1" strike="noStrike">
+              <a:latin typeface="Arial"/>
             </a:endParaRPr>
           </a:p>
         </p:txBody>
@@ -358,7 +335,7 @@
       </p:grpSpPr>
       <p:sp>
         <p:nvSpPr>
-          <p:cNvPr id="34" name="PlaceHolder 1"/>
+          <p:cNvPr id="30" name="PlaceHolder 1"/>
           <p:cNvSpPr>
             <a:spLocks noGrp="1"/>
           </p:cNvSpPr>
@@ -369,7 +346,7 @@
         <p:spPr>
           <a:xfrm>
             <a:off x="1523880" y="1122480"/>
-            <a:ext cx="9143640" cy="2387160"/>
+            <a:ext cx="9143280" cy="2386800"/>
           </a:xfrm>
           <a:prstGeom prst="rect">
             <a:avLst/>
@@ -378,18 +355,16 @@
         <p:txBody>
           <a:bodyPr lIns="0" rIns="0" tIns="0" bIns="0" anchor="ctr"/>
           <a:p>
-            <a:endParaRPr b="0" lang="en-US" sz="1800" spc="-1" strike="noStrike">
-              <a:solidFill>
-                <a:srgbClr val="000000"/>
-              </a:solidFill>
-              <a:latin typeface="Calibri"/>
+            <a:pPr algn="ctr"/>
+            <a:endParaRPr b="0" lang="en-IN" sz="4400" spc="-1" strike="noStrike">
+              <a:latin typeface="Arial"/>
             </a:endParaRPr>
           </a:p>
         </p:txBody>
       </p:sp>
       <p:sp>
         <p:nvSpPr>
-          <p:cNvPr id="35" name="PlaceHolder 2"/>
+          <p:cNvPr id="31" name="PlaceHolder 2"/>
           <p:cNvSpPr>
             <a:spLocks noGrp="1"/>
           </p:cNvSpPr>
@@ -411,18 +386,15 @@
             <a:normAutofit/>
           </a:bodyPr>
           <a:p>
-            <a:endParaRPr b="0" lang="en-US" sz="2800" spc="-1" strike="noStrike">
-              <a:solidFill>
-                <a:srgbClr val="000000"/>
-              </a:solidFill>
-              <a:latin typeface="Calibri"/>
+            <a:endParaRPr b="0" lang="en-IN" sz="3200" spc="-1" strike="noStrike">
+              <a:latin typeface="Arial"/>
             </a:endParaRPr>
           </a:p>
         </p:txBody>
       </p:sp>
       <p:sp>
         <p:nvSpPr>
-          <p:cNvPr id="36" name="PlaceHolder 3"/>
+          <p:cNvPr id="32" name="PlaceHolder 3"/>
           <p:cNvSpPr>
             <a:spLocks noGrp="1"/>
           </p:cNvSpPr>
@@ -444,18 +416,15 @@
             <a:normAutofit/>
           </a:bodyPr>
           <a:p>
-            <a:endParaRPr b="0" lang="en-US" sz="2800" spc="-1" strike="noStrike">
-              <a:solidFill>
-                <a:srgbClr val="000000"/>
-              </a:solidFill>
-              <a:latin typeface="Calibri"/>
+            <a:endParaRPr b="0" lang="en-IN" sz="3200" spc="-1" strike="noStrike">
+              <a:latin typeface="Arial"/>
             </a:endParaRPr>
           </a:p>
         </p:txBody>
       </p:sp>
       <p:sp>
         <p:nvSpPr>
-          <p:cNvPr id="37" name="PlaceHolder 4"/>
+          <p:cNvPr id="33" name="PlaceHolder 4"/>
           <p:cNvSpPr>
             <a:spLocks noGrp="1"/>
           </p:cNvSpPr>
@@ -477,18 +446,15 @@
             <a:normAutofit/>
           </a:bodyPr>
           <a:p>
-            <a:endParaRPr b="0" lang="en-US" sz="2800" spc="-1" strike="noStrike">
-              <a:solidFill>
-                <a:srgbClr val="000000"/>
-              </a:solidFill>
-              <a:latin typeface="Calibri"/>
+            <a:endParaRPr b="0" lang="en-IN" sz="3200" spc="-1" strike="noStrike">
+              <a:latin typeface="Arial"/>
             </a:endParaRPr>
           </a:p>
         </p:txBody>
       </p:sp>
       <p:sp>
         <p:nvSpPr>
-          <p:cNvPr id="38" name="PlaceHolder 5"/>
+          <p:cNvPr id="34" name="PlaceHolder 5"/>
           <p:cNvSpPr>
             <a:spLocks noGrp="1"/>
           </p:cNvSpPr>
@@ -510,18 +476,15 @@
             <a:normAutofit/>
           </a:bodyPr>
           <a:p>
-            <a:endParaRPr b="0" lang="en-US" sz="2800" spc="-1" strike="noStrike">
-              <a:solidFill>
-                <a:srgbClr val="000000"/>
-              </a:solidFill>
-              <a:latin typeface="Calibri"/>
+            <a:endParaRPr b="0" lang="en-IN" sz="3200" spc="-1" strike="noStrike">
+              <a:latin typeface="Arial"/>
             </a:endParaRPr>
           </a:p>
         </p:txBody>
       </p:sp>
       <p:sp>
         <p:nvSpPr>
-          <p:cNvPr id="39" name="PlaceHolder 6"/>
+          <p:cNvPr id="35" name="PlaceHolder 6"/>
           <p:cNvSpPr>
             <a:spLocks noGrp="1"/>
           </p:cNvSpPr>
@@ -543,18 +506,15 @@
             <a:normAutofit/>
           </a:bodyPr>
           <a:p>
-            <a:endParaRPr b="0" lang="en-US" sz="2800" spc="-1" strike="noStrike">
-              <a:solidFill>
-                <a:srgbClr val="000000"/>
-              </a:solidFill>
-              <a:latin typeface="Calibri"/>
+            <a:endParaRPr b="0" lang="en-IN" sz="3200" spc="-1" strike="noStrike">
+              <a:latin typeface="Arial"/>
             </a:endParaRPr>
           </a:p>
         </p:txBody>
       </p:sp>
       <p:sp>
         <p:nvSpPr>
-          <p:cNvPr id="40" name="PlaceHolder 7"/>
+          <p:cNvPr id="36" name="PlaceHolder 7"/>
           <p:cNvSpPr>
             <a:spLocks noGrp="1"/>
           </p:cNvSpPr>
@@ -576,576 +536,8 @@
             <a:normAutofit/>
           </a:bodyPr>
           <a:p>
-            <a:endParaRPr b="0" lang="en-US" sz="2800" spc="-1" strike="noStrike">
-              <a:solidFill>
-                <a:srgbClr val="000000"/>
-              </a:solidFill>
-              <a:latin typeface="Calibri"/>
-            </a:endParaRPr>
-          </a:p>
-        </p:txBody>
-      </p:sp>
-    </p:spTree>
-  </p:cSld>
-</p:sldLayout>
-</file>
-
-<file path=ppt/slideLayouts/slideLayout13.xml><?xml version="1.0" encoding="utf-8"?>
-<p:sldLayout xmlns:a="http://schemas.openxmlformats.org/drawingml/2006/main" xmlns:p="http://schemas.openxmlformats.org/presentationml/2006/main" xmlns:r="http://schemas.openxmlformats.org/officeDocument/2006/relationships" xmlns:p14="http://schemas.microsoft.com/office/powerpoint/2010/main" xmlns:p15="http://schemas.microsoft.com/office/powerpoint/2012/main" xmlns:mc="http://schemas.openxmlformats.org/markup-compatibility/2006" type="blank" preserve="1">
-  <p:cSld name="Blank Slide">
-    <p:spTree>
-      <p:nvGrpSpPr>
-        <p:cNvPr id="1" name=""/>
-        <p:cNvGrpSpPr/>
-        <p:nvPr/>
-      </p:nvGrpSpPr>
-      <p:grpSpPr>
-        <a:xfrm>
-          <a:off x="0" y="0"/>
-          <a:ext cx="0" cy="0"/>
-          <a:chOff x="0" y="0"/>
-          <a:chExt cx="0" cy="0"/>
-        </a:xfrm>
-      </p:grpSpPr>
-    </p:spTree>
-  </p:cSld>
-</p:sldLayout>
-</file>
-
-<file path=ppt/slideLayouts/slideLayout14.xml><?xml version="1.0" encoding="utf-8"?>
-<p:sldLayout xmlns:a="http://schemas.openxmlformats.org/drawingml/2006/main" xmlns:p="http://schemas.openxmlformats.org/presentationml/2006/main" xmlns:r="http://schemas.openxmlformats.org/officeDocument/2006/relationships" xmlns:p14="http://schemas.microsoft.com/office/powerpoint/2010/main" xmlns:p15="http://schemas.microsoft.com/office/powerpoint/2012/main" xmlns:mc="http://schemas.openxmlformats.org/markup-compatibility/2006" type="tx" preserve="1">
-  <p:cSld name="Title Slide">
-    <p:spTree>
-      <p:nvGrpSpPr>
-        <p:cNvPr id="1" name=""/>
-        <p:cNvGrpSpPr/>
-        <p:nvPr/>
-      </p:nvGrpSpPr>
-      <p:grpSpPr>
-        <a:xfrm>
-          <a:off x="0" y="0"/>
-          <a:ext cx="0" cy="0"/>
-          <a:chOff x="0" y="0"/>
-          <a:chExt cx="0" cy="0"/>
-        </a:xfrm>
-      </p:grpSpPr>
-      <p:sp>
-        <p:nvSpPr>
-          <p:cNvPr id="46" name="PlaceHolder 1"/>
-          <p:cNvSpPr>
-            <a:spLocks noGrp="1"/>
-          </p:cNvSpPr>
-          <p:nvPr>
-            <p:ph type="title"/>
-          </p:nvPr>
-        </p:nvSpPr>
-        <p:spPr>
-          <a:xfrm>
-            <a:off x="1523880" y="1122480"/>
-            <a:ext cx="9143640" cy="2387160"/>
-          </a:xfrm>
-          <a:prstGeom prst="rect">
-            <a:avLst/>
-          </a:prstGeom>
-        </p:spPr>
-        <p:txBody>
-          <a:bodyPr lIns="0" rIns="0" tIns="0" bIns="0" anchor="ctr"/>
-          <a:p>
-            <a:endParaRPr b="0" lang="en-US" sz="1800" spc="-1" strike="noStrike">
-              <a:solidFill>
-                <a:srgbClr val="000000"/>
-              </a:solidFill>
-              <a:latin typeface="Calibri"/>
-            </a:endParaRPr>
-          </a:p>
-        </p:txBody>
-      </p:sp>
-      <p:sp>
-        <p:nvSpPr>
-          <p:cNvPr id="47" name="PlaceHolder 2"/>
-          <p:cNvSpPr>
-            <a:spLocks noGrp="1"/>
-          </p:cNvSpPr>
-          <p:nvPr>
-            <p:ph type="subTitle"/>
-          </p:nvPr>
-        </p:nvSpPr>
-        <p:spPr>
-          <a:xfrm>
-            <a:off x="609480" y="1604520"/>
-            <a:ext cx="10972440" cy="3977280"/>
-          </a:xfrm>
-          <a:prstGeom prst="rect">
-            <a:avLst/>
-          </a:prstGeom>
-        </p:spPr>
-        <p:txBody>
-          <a:bodyPr lIns="0" rIns="0" tIns="0" bIns="0" anchor="ctr"/>
-          <a:p>
-            <a:pPr algn="ctr"/>
             <a:endParaRPr b="0" lang="en-IN" sz="3200" spc="-1" strike="noStrike">
               <a:latin typeface="Arial"/>
-            </a:endParaRPr>
-          </a:p>
-        </p:txBody>
-      </p:sp>
-    </p:spTree>
-  </p:cSld>
-</p:sldLayout>
-</file>
-
-<file path=ppt/slideLayouts/slideLayout15.xml><?xml version="1.0" encoding="utf-8"?>
-<p:sldLayout xmlns:a="http://schemas.openxmlformats.org/drawingml/2006/main" xmlns:p="http://schemas.openxmlformats.org/presentationml/2006/main" xmlns:r="http://schemas.openxmlformats.org/officeDocument/2006/relationships" xmlns:p14="http://schemas.microsoft.com/office/powerpoint/2010/main" xmlns:p15="http://schemas.microsoft.com/office/powerpoint/2012/main" xmlns:mc="http://schemas.openxmlformats.org/markup-compatibility/2006" type="obj" preserve="1">
-  <p:cSld name="Title, Content">
-    <p:spTree>
-      <p:nvGrpSpPr>
-        <p:cNvPr id="1" name=""/>
-        <p:cNvGrpSpPr/>
-        <p:nvPr/>
-      </p:nvGrpSpPr>
-      <p:grpSpPr>
-        <a:xfrm>
-          <a:off x="0" y="0"/>
-          <a:ext cx="0" cy="0"/>
-          <a:chOff x="0" y="0"/>
-          <a:chExt cx="0" cy="0"/>
-        </a:xfrm>
-      </p:grpSpPr>
-      <p:sp>
-        <p:nvSpPr>
-          <p:cNvPr id="48" name="PlaceHolder 1"/>
-          <p:cNvSpPr>
-            <a:spLocks noGrp="1"/>
-          </p:cNvSpPr>
-          <p:nvPr>
-            <p:ph type="title"/>
-          </p:nvPr>
-        </p:nvSpPr>
-        <p:spPr>
-          <a:xfrm>
-            <a:off x="1523880" y="1122480"/>
-            <a:ext cx="9143640" cy="2387160"/>
-          </a:xfrm>
-          <a:prstGeom prst="rect">
-            <a:avLst/>
-          </a:prstGeom>
-        </p:spPr>
-        <p:txBody>
-          <a:bodyPr lIns="0" rIns="0" tIns="0" bIns="0" anchor="ctr"/>
-          <a:p>
-            <a:endParaRPr b="0" lang="en-US" sz="1800" spc="-1" strike="noStrike">
-              <a:solidFill>
-                <a:srgbClr val="000000"/>
-              </a:solidFill>
-              <a:latin typeface="Calibri"/>
-            </a:endParaRPr>
-          </a:p>
-        </p:txBody>
-      </p:sp>
-      <p:sp>
-        <p:nvSpPr>
-          <p:cNvPr id="49" name="PlaceHolder 2"/>
-          <p:cNvSpPr>
-            <a:spLocks noGrp="1"/>
-          </p:cNvSpPr>
-          <p:nvPr>
-            <p:ph type="body"/>
-          </p:nvPr>
-        </p:nvSpPr>
-        <p:spPr>
-          <a:xfrm>
-            <a:off x="609480" y="1604520"/>
-            <a:ext cx="10972440" cy="3977280"/>
-          </a:xfrm>
-          <a:prstGeom prst="rect">
-            <a:avLst/>
-          </a:prstGeom>
-        </p:spPr>
-        <p:txBody>
-          <a:bodyPr lIns="0" rIns="0" tIns="0" bIns="0">
-            <a:normAutofit/>
-          </a:bodyPr>
-          <a:p>
-            <a:endParaRPr b="0" lang="en-US" sz="2800" spc="-1" strike="noStrike">
-              <a:solidFill>
-                <a:srgbClr val="000000"/>
-              </a:solidFill>
-              <a:latin typeface="Calibri"/>
-            </a:endParaRPr>
-          </a:p>
-        </p:txBody>
-      </p:sp>
-    </p:spTree>
-  </p:cSld>
-</p:sldLayout>
-</file>
-
-<file path=ppt/slideLayouts/slideLayout16.xml><?xml version="1.0" encoding="utf-8"?>
-<p:sldLayout xmlns:a="http://schemas.openxmlformats.org/drawingml/2006/main" xmlns:p="http://schemas.openxmlformats.org/presentationml/2006/main" xmlns:r="http://schemas.openxmlformats.org/officeDocument/2006/relationships" xmlns:p14="http://schemas.microsoft.com/office/powerpoint/2010/main" xmlns:p15="http://schemas.microsoft.com/office/powerpoint/2012/main" xmlns:mc="http://schemas.openxmlformats.org/markup-compatibility/2006" type="twoObj" preserve="1">
-  <p:cSld name="Title, 2 Content">
-    <p:spTree>
-      <p:nvGrpSpPr>
-        <p:cNvPr id="1" name=""/>
-        <p:cNvGrpSpPr/>
-        <p:nvPr/>
-      </p:nvGrpSpPr>
-      <p:grpSpPr>
-        <a:xfrm>
-          <a:off x="0" y="0"/>
-          <a:ext cx="0" cy="0"/>
-          <a:chOff x="0" y="0"/>
-          <a:chExt cx="0" cy="0"/>
-        </a:xfrm>
-      </p:grpSpPr>
-      <p:sp>
-        <p:nvSpPr>
-          <p:cNvPr id="50" name="PlaceHolder 1"/>
-          <p:cNvSpPr>
-            <a:spLocks noGrp="1"/>
-          </p:cNvSpPr>
-          <p:nvPr>
-            <p:ph type="title"/>
-          </p:nvPr>
-        </p:nvSpPr>
-        <p:spPr>
-          <a:xfrm>
-            <a:off x="1523880" y="1122480"/>
-            <a:ext cx="9143640" cy="2387160"/>
-          </a:xfrm>
-          <a:prstGeom prst="rect">
-            <a:avLst/>
-          </a:prstGeom>
-        </p:spPr>
-        <p:txBody>
-          <a:bodyPr lIns="0" rIns="0" tIns="0" bIns="0" anchor="ctr"/>
-          <a:p>
-            <a:endParaRPr b="0" lang="en-US" sz="1800" spc="-1" strike="noStrike">
-              <a:solidFill>
-                <a:srgbClr val="000000"/>
-              </a:solidFill>
-              <a:latin typeface="Calibri"/>
-            </a:endParaRPr>
-          </a:p>
-        </p:txBody>
-      </p:sp>
-      <p:sp>
-        <p:nvSpPr>
-          <p:cNvPr id="51" name="PlaceHolder 2"/>
-          <p:cNvSpPr>
-            <a:spLocks noGrp="1"/>
-          </p:cNvSpPr>
-          <p:nvPr>
-            <p:ph type="body"/>
-          </p:nvPr>
-        </p:nvSpPr>
-        <p:spPr>
-          <a:xfrm>
-            <a:off x="609480" y="1604520"/>
-            <a:ext cx="5354280" cy="3977280"/>
-          </a:xfrm>
-          <a:prstGeom prst="rect">
-            <a:avLst/>
-          </a:prstGeom>
-        </p:spPr>
-        <p:txBody>
-          <a:bodyPr lIns="0" rIns="0" tIns="0" bIns="0">
-            <a:normAutofit/>
-          </a:bodyPr>
-          <a:p>
-            <a:endParaRPr b="0" lang="en-US" sz="2800" spc="-1" strike="noStrike">
-              <a:solidFill>
-                <a:srgbClr val="000000"/>
-              </a:solidFill>
-              <a:latin typeface="Calibri"/>
-            </a:endParaRPr>
-          </a:p>
-        </p:txBody>
-      </p:sp>
-      <p:sp>
-        <p:nvSpPr>
-          <p:cNvPr id="52" name="PlaceHolder 3"/>
-          <p:cNvSpPr>
-            <a:spLocks noGrp="1"/>
-          </p:cNvSpPr>
-          <p:nvPr>
-            <p:ph type="body"/>
-          </p:nvPr>
-        </p:nvSpPr>
-        <p:spPr>
-          <a:xfrm>
-            <a:off x="6231960" y="1604520"/>
-            <a:ext cx="5354280" cy="3977280"/>
-          </a:xfrm>
-          <a:prstGeom prst="rect">
-            <a:avLst/>
-          </a:prstGeom>
-        </p:spPr>
-        <p:txBody>
-          <a:bodyPr lIns="0" rIns="0" tIns="0" bIns="0">
-            <a:normAutofit/>
-          </a:bodyPr>
-          <a:p>
-            <a:endParaRPr b="0" lang="en-US" sz="2800" spc="-1" strike="noStrike">
-              <a:solidFill>
-                <a:srgbClr val="000000"/>
-              </a:solidFill>
-              <a:latin typeface="Calibri"/>
-            </a:endParaRPr>
-          </a:p>
-        </p:txBody>
-      </p:sp>
-    </p:spTree>
-  </p:cSld>
-</p:sldLayout>
-</file>
-
-<file path=ppt/slideLayouts/slideLayout17.xml><?xml version="1.0" encoding="utf-8"?>
-<p:sldLayout xmlns:a="http://schemas.openxmlformats.org/drawingml/2006/main" xmlns:p="http://schemas.openxmlformats.org/presentationml/2006/main" xmlns:r="http://schemas.openxmlformats.org/officeDocument/2006/relationships" xmlns:p14="http://schemas.microsoft.com/office/powerpoint/2010/main" xmlns:p15="http://schemas.microsoft.com/office/powerpoint/2012/main" xmlns:mc="http://schemas.openxmlformats.org/markup-compatibility/2006" type="titleOnly" preserve="1">
-  <p:cSld name="Title Only">
-    <p:spTree>
-      <p:nvGrpSpPr>
-        <p:cNvPr id="1" name=""/>
-        <p:cNvGrpSpPr/>
-        <p:nvPr/>
-      </p:nvGrpSpPr>
-      <p:grpSpPr>
-        <a:xfrm>
-          <a:off x="0" y="0"/>
-          <a:ext cx="0" cy="0"/>
-          <a:chOff x="0" y="0"/>
-          <a:chExt cx="0" cy="0"/>
-        </a:xfrm>
-      </p:grpSpPr>
-      <p:sp>
-        <p:nvSpPr>
-          <p:cNvPr id="53" name="PlaceHolder 1"/>
-          <p:cNvSpPr>
-            <a:spLocks noGrp="1"/>
-          </p:cNvSpPr>
-          <p:nvPr>
-            <p:ph type="title"/>
-          </p:nvPr>
-        </p:nvSpPr>
-        <p:spPr>
-          <a:xfrm>
-            <a:off x="1523880" y="1122480"/>
-            <a:ext cx="9143640" cy="2387160"/>
-          </a:xfrm>
-          <a:prstGeom prst="rect">
-            <a:avLst/>
-          </a:prstGeom>
-        </p:spPr>
-        <p:txBody>
-          <a:bodyPr lIns="0" rIns="0" tIns="0" bIns="0" anchor="ctr"/>
-          <a:p>
-            <a:endParaRPr b="0" lang="en-US" sz="1800" spc="-1" strike="noStrike">
-              <a:solidFill>
-                <a:srgbClr val="000000"/>
-              </a:solidFill>
-              <a:latin typeface="Calibri"/>
-            </a:endParaRPr>
-          </a:p>
-        </p:txBody>
-      </p:sp>
-    </p:spTree>
-  </p:cSld>
-</p:sldLayout>
-</file>
-
-<file path=ppt/slideLayouts/slideLayout18.xml><?xml version="1.0" encoding="utf-8"?>
-<p:sldLayout xmlns:a="http://schemas.openxmlformats.org/drawingml/2006/main" xmlns:p="http://schemas.openxmlformats.org/presentationml/2006/main" xmlns:r="http://schemas.openxmlformats.org/officeDocument/2006/relationships" xmlns:p14="http://schemas.microsoft.com/office/powerpoint/2010/main" xmlns:p15="http://schemas.microsoft.com/office/powerpoint/2012/main" xmlns:mc="http://schemas.openxmlformats.org/markup-compatibility/2006" type="objOnly" preserve="1">
-  <p:cSld name="Centered Text">
-    <p:spTree>
-      <p:nvGrpSpPr>
-        <p:cNvPr id="1" name=""/>
-        <p:cNvGrpSpPr/>
-        <p:nvPr/>
-      </p:nvGrpSpPr>
-      <p:grpSpPr>
-        <a:xfrm>
-          <a:off x="0" y="0"/>
-          <a:ext cx="0" cy="0"/>
-          <a:chOff x="0" y="0"/>
-          <a:chExt cx="0" cy="0"/>
-        </a:xfrm>
-      </p:grpSpPr>
-      <p:sp>
-        <p:nvSpPr>
-          <p:cNvPr id="54" name="PlaceHolder 1"/>
-          <p:cNvSpPr>
-            <a:spLocks noGrp="1"/>
-          </p:cNvSpPr>
-          <p:nvPr>
-            <p:ph type="subTitle"/>
-          </p:nvPr>
-        </p:nvSpPr>
-        <p:spPr>
-          <a:xfrm>
-            <a:off x="1523880" y="1122480"/>
-            <a:ext cx="9143640" cy="11066760"/>
-          </a:xfrm>
-          <a:prstGeom prst="rect">
-            <a:avLst/>
-          </a:prstGeom>
-        </p:spPr>
-        <p:txBody>
-          <a:bodyPr lIns="0" rIns="0" tIns="0" bIns="0" anchor="ctr"/>
-          <a:p>
-            <a:pPr algn="ctr"/>
-            <a:endParaRPr b="0" lang="en-IN" sz="3200" spc="-1" strike="noStrike">
-              <a:latin typeface="Arial"/>
-            </a:endParaRPr>
-          </a:p>
-        </p:txBody>
-      </p:sp>
-    </p:spTree>
-  </p:cSld>
-</p:sldLayout>
-</file>
-
-<file path=ppt/slideLayouts/slideLayout19.xml><?xml version="1.0" encoding="utf-8"?>
-<p:sldLayout xmlns:a="http://schemas.openxmlformats.org/drawingml/2006/main" xmlns:p="http://schemas.openxmlformats.org/presentationml/2006/main" xmlns:r="http://schemas.openxmlformats.org/officeDocument/2006/relationships" xmlns:p14="http://schemas.microsoft.com/office/powerpoint/2010/main" xmlns:p15="http://schemas.microsoft.com/office/powerpoint/2012/main" xmlns:mc="http://schemas.openxmlformats.org/markup-compatibility/2006" type="twoObjAndObj" preserve="1">
-  <p:cSld name="Title, 2 Content and Content">
-    <p:spTree>
-      <p:nvGrpSpPr>
-        <p:cNvPr id="1" name=""/>
-        <p:cNvGrpSpPr/>
-        <p:nvPr/>
-      </p:nvGrpSpPr>
-      <p:grpSpPr>
-        <a:xfrm>
-          <a:off x="0" y="0"/>
-          <a:ext cx="0" cy="0"/>
-          <a:chOff x="0" y="0"/>
-          <a:chExt cx="0" cy="0"/>
-        </a:xfrm>
-      </p:grpSpPr>
-      <p:sp>
-        <p:nvSpPr>
-          <p:cNvPr id="55" name="PlaceHolder 1"/>
-          <p:cNvSpPr>
-            <a:spLocks noGrp="1"/>
-          </p:cNvSpPr>
-          <p:nvPr>
-            <p:ph type="title"/>
-          </p:nvPr>
-        </p:nvSpPr>
-        <p:spPr>
-          <a:xfrm>
-            <a:off x="1523880" y="1122480"/>
-            <a:ext cx="9143640" cy="2387160"/>
-          </a:xfrm>
-          <a:prstGeom prst="rect">
-            <a:avLst/>
-          </a:prstGeom>
-        </p:spPr>
-        <p:txBody>
-          <a:bodyPr lIns="0" rIns="0" tIns="0" bIns="0" anchor="ctr"/>
-          <a:p>
-            <a:endParaRPr b="0" lang="en-US" sz="1800" spc="-1" strike="noStrike">
-              <a:solidFill>
-                <a:srgbClr val="000000"/>
-              </a:solidFill>
-              <a:latin typeface="Calibri"/>
-            </a:endParaRPr>
-          </a:p>
-        </p:txBody>
-      </p:sp>
-      <p:sp>
-        <p:nvSpPr>
-          <p:cNvPr id="56" name="PlaceHolder 2"/>
-          <p:cNvSpPr>
-            <a:spLocks noGrp="1"/>
-          </p:cNvSpPr>
-          <p:nvPr>
-            <p:ph type="body"/>
-          </p:nvPr>
-        </p:nvSpPr>
-        <p:spPr>
-          <a:xfrm>
-            <a:off x="609480" y="1604520"/>
-            <a:ext cx="5354280" cy="1896840"/>
-          </a:xfrm>
-          <a:prstGeom prst="rect">
-            <a:avLst/>
-          </a:prstGeom>
-        </p:spPr>
-        <p:txBody>
-          <a:bodyPr lIns="0" rIns="0" tIns="0" bIns="0">
-            <a:normAutofit/>
-          </a:bodyPr>
-          <a:p>
-            <a:endParaRPr b="0" lang="en-US" sz="2800" spc="-1" strike="noStrike">
-              <a:solidFill>
-                <a:srgbClr val="000000"/>
-              </a:solidFill>
-              <a:latin typeface="Calibri"/>
-            </a:endParaRPr>
-          </a:p>
-        </p:txBody>
-      </p:sp>
-      <p:sp>
-        <p:nvSpPr>
-          <p:cNvPr id="57" name="PlaceHolder 3"/>
-          <p:cNvSpPr>
-            <a:spLocks noGrp="1"/>
-          </p:cNvSpPr>
-          <p:nvPr>
-            <p:ph type="body"/>
-          </p:nvPr>
-        </p:nvSpPr>
-        <p:spPr>
-          <a:xfrm>
-            <a:off x="6231960" y="1604520"/>
-            <a:ext cx="5354280" cy="3977280"/>
-          </a:xfrm>
-          <a:prstGeom prst="rect">
-            <a:avLst/>
-          </a:prstGeom>
-        </p:spPr>
-        <p:txBody>
-          <a:bodyPr lIns="0" rIns="0" tIns="0" bIns="0">
-            <a:normAutofit/>
-          </a:bodyPr>
-          <a:p>
-            <a:endParaRPr b="0" lang="en-US" sz="2800" spc="-1" strike="noStrike">
-              <a:solidFill>
-                <a:srgbClr val="000000"/>
-              </a:solidFill>
-              <a:latin typeface="Calibri"/>
-            </a:endParaRPr>
-          </a:p>
-        </p:txBody>
-      </p:sp>
-      <p:sp>
-        <p:nvSpPr>
-          <p:cNvPr id="58" name="PlaceHolder 4"/>
-          <p:cNvSpPr>
-            <a:spLocks noGrp="1"/>
-          </p:cNvSpPr>
-          <p:nvPr>
-            <p:ph type="body"/>
-          </p:nvPr>
-        </p:nvSpPr>
-        <p:spPr>
-          <a:xfrm>
-            <a:off x="609480" y="3682080"/>
-            <a:ext cx="5354280" cy="1896840"/>
-          </a:xfrm>
-          <a:prstGeom prst="rect">
-            <a:avLst/>
-          </a:prstGeom>
-        </p:spPr>
-        <p:txBody>
-          <a:bodyPr lIns="0" rIns="0" tIns="0" bIns="0">
-            <a:normAutofit/>
-          </a:bodyPr>
-          <a:p>
-            <a:endParaRPr b="0" lang="en-US" sz="2800" spc="-1" strike="noStrike">
-              <a:solidFill>
-                <a:srgbClr val="000000"/>
-              </a:solidFill>
-              <a:latin typeface="Calibri"/>
             </a:endParaRPr>
           </a:p>
         </p:txBody>
@@ -1174,7 +566,7 @@
       </p:grpSpPr>
       <p:sp>
         <p:nvSpPr>
-          <p:cNvPr id="5" name="PlaceHolder 1"/>
+          <p:cNvPr id="1" name="PlaceHolder 1"/>
           <p:cNvSpPr>
             <a:spLocks noGrp="1"/>
           </p:cNvSpPr>
@@ -1185,7 +577,7 @@
         <p:spPr>
           <a:xfrm>
             <a:off x="1523880" y="1122480"/>
-            <a:ext cx="9143640" cy="2387160"/>
+            <a:ext cx="9143280" cy="2386800"/>
           </a:xfrm>
           <a:prstGeom prst="rect">
             <a:avLst/>
@@ -1194,18 +586,16 @@
         <p:txBody>
           <a:bodyPr lIns="0" rIns="0" tIns="0" bIns="0" anchor="ctr"/>
           <a:p>
-            <a:endParaRPr b="0" lang="en-US" sz="1800" spc="-1" strike="noStrike">
-              <a:solidFill>
-                <a:srgbClr val="000000"/>
-              </a:solidFill>
-              <a:latin typeface="Calibri"/>
+            <a:pPr algn="ctr"/>
+            <a:endParaRPr b="0" lang="en-IN" sz="4400" spc="-1" strike="noStrike">
+              <a:latin typeface="Arial"/>
             </a:endParaRPr>
           </a:p>
         </p:txBody>
       </p:sp>
       <p:sp>
         <p:nvSpPr>
-          <p:cNvPr id="6" name="PlaceHolder 2"/>
+          <p:cNvPr id="2" name="PlaceHolder 2"/>
           <p:cNvSpPr>
             <a:spLocks noGrp="1"/>
           </p:cNvSpPr>
@@ -1228,865 +618,6 @@
             <a:pPr algn="ctr"/>
             <a:endParaRPr b="0" lang="en-IN" sz="3200" spc="-1" strike="noStrike">
               <a:latin typeface="Arial"/>
-            </a:endParaRPr>
-          </a:p>
-        </p:txBody>
-      </p:sp>
-    </p:spTree>
-  </p:cSld>
-</p:sldLayout>
-</file>
-
-<file path=ppt/slideLayouts/slideLayout20.xml><?xml version="1.0" encoding="utf-8"?>
-<p:sldLayout xmlns:a="http://schemas.openxmlformats.org/drawingml/2006/main" xmlns:p="http://schemas.openxmlformats.org/presentationml/2006/main" xmlns:r="http://schemas.openxmlformats.org/officeDocument/2006/relationships" xmlns:p14="http://schemas.microsoft.com/office/powerpoint/2010/main" xmlns:p15="http://schemas.microsoft.com/office/powerpoint/2012/main" xmlns:mc="http://schemas.openxmlformats.org/markup-compatibility/2006" type="objAndTwoObj" preserve="1">
-  <p:cSld name="Title Content and 2 Content">
-    <p:spTree>
-      <p:nvGrpSpPr>
-        <p:cNvPr id="1" name=""/>
-        <p:cNvGrpSpPr/>
-        <p:nvPr/>
-      </p:nvGrpSpPr>
-      <p:grpSpPr>
-        <a:xfrm>
-          <a:off x="0" y="0"/>
-          <a:ext cx="0" cy="0"/>
-          <a:chOff x="0" y="0"/>
-          <a:chExt cx="0" cy="0"/>
-        </a:xfrm>
-      </p:grpSpPr>
-      <p:sp>
-        <p:nvSpPr>
-          <p:cNvPr id="59" name="PlaceHolder 1"/>
-          <p:cNvSpPr>
-            <a:spLocks noGrp="1"/>
-          </p:cNvSpPr>
-          <p:nvPr>
-            <p:ph type="title"/>
-          </p:nvPr>
-        </p:nvSpPr>
-        <p:spPr>
-          <a:xfrm>
-            <a:off x="1523880" y="1122480"/>
-            <a:ext cx="9143640" cy="2387160"/>
-          </a:xfrm>
-          <a:prstGeom prst="rect">
-            <a:avLst/>
-          </a:prstGeom>
-        </p:spPr>
-        <p:txBody>
-          <a:bodyPr lIns="0" rIns="0" tIns="0" bIns="0" anchor="ctr"/>
-          <a:p>
-            <a:endParaRPr b="0" lang="en-US" sz="1800" spc="-1" strike="noStrike">
-              <a:solidFill>
-                <a:srgbClr val="000000"/>
-              </a:solidFill>
-              <a:latin typeface="Calibri"/>
-            </a:endParaRPr>
-          </a:p>
-        </p:txBody>
-      </p:sp>
-      <p:sp>
-        <p:nvSpPr>
-          <p:cNvPr id="60" name="PlaceHolder 2"/>
-          <p:cNvSpPr>
-            <a:spLocks noGrp="1"/>
-          </p:cNvSpPr>
-          <p:nvPr>
-            <p:ph type="body"/>
-          </p:nvPr>
-        </p:nvSpPr>
-        <p:spPr>
-          <a:xfrm>
-            <a:off x="609480" y="1604520"/>
-            <a:ext cx="5354280" cy="3977280"/>
-          </a:xfrm>
-          <a:prstGeom prst="rect">
-            <a:avLst/>
-          </a:prstGeom>
-        </p:spPr>
-        <p:txBody>
-          <a:bodyPr lIns="0" rIns="0" tIns="0" bIns="0">
-            <a:normAutofit/>
-          </a:bodyPr>
-          <a:p>
-            <a:endParaRPr b="0" lang="en-US" sz="2800" spc="-1" strike="noStrike">
-              <a:solidFill>
-                <a:srgbClr val="000000"/>
-              </a:solidFill>
-              <a:latin typeface="Calibri"/>
-            </a:endParaRPr>
-          </a:p>
-        </p:txBody>
-      </p:sp>
-      <p:sp>
-        <p:nvSpPr>
-          <p:cNvPr id="61" name="PlaceHolder 3"/>
-          <p:cNvSpPr>
-            <a:spLocks noGrp="1"/>
-          </p:cNvSpPr>
-          <p:nvPr>
-            <p:ph type="body"/>
-          </p:nvPr>
-        </p:nvSpPr>
-        <p:spPr>
-          <a:xfrm>
-            <a:off x="6231960" y="1604520"/>
-            <a:ext cx="5354280" cy="1896840"/>
-          </a:xfrm>
-          <a:prstGeom prst="rect">
-            <a:avLst/>
-          </a:prstGeom>
-        </p:spPr>
-        <p:txBody>
-          <a:bodyPr lIns="0" rIns="0" tIns="0" bIns="0">
-            <a:normAutofit/>
-          </a:bodyPr>
-          <a:p>
-            <a:endParaRPr b="0" lang="en-US" sz="2800" spc="-1" strike="noStrike">
-              <a:solidFill>
-                <a:srgbClr val="000000"/>
-              </a:solidFill>
-              <a:latin typeface="Calibri"/>
-            </a:endParaRPr>
-          </a:p>
-        </p:txBody>
-      </p:sp>
-      <p:sp>
-        <p:nvSpPr>
-          <p:cNvPr id="62" name="PlaceHolder 4"/>
-          <p:cNvSpPr>
-            <a:spLocks noGrp="1"/>
-          </p:cNvSpPr>
-          <p:nvPr>
-            <p:ph type="body"/>
-          </p:nvPr>
-        </p:nvSpPr>
-        <p:spPr>
-          <a:xfrm>
-            <a:off x="6231960" y="3682080"/>
-            <a:ext cx="5354280" cy="1896840"/>
-          </a:xfrm>
-          <a:prstGeom prst="rect">
-            <a:avLst/>
-          </a:prstGeom>
-        </p:spPr>
-        <p:txBody>
-          <a:bodyPr lIns="0" rIns="0" tIns="0" bIns="0">
-            <a:normAutofit/>
-          </a:bodyPr>
-          <a:p>
-            <a:endParaRPr b="0" lang="en-US" sz="2800" spc="-1" strike="noStrike">
-              <a:solidFill>
-                <a:srgbClr val="000000"/>
-              </a:solidFill>
-              <a:latin typeface="Calibri"/>
-            </a:endParaRPr>
-          </a:p>
-        </p:txBody>
-      </p:sp>
-    </p:spTree>
-  </p:cSld>
-</p:sldLayout>
-</file>
-
-<file path=ppt/slideLayouts/slideLayout21.xml><?xml version="1.0" encoding="utf-8"?>
-<p:sldLayout xmlns:a="http://schemas.openxmlformats.org/drawingml/2006/main" xmlns:p="http://schemas.openxmlformats.org/presentationml/2006/main" xmlns:r="http://schemas.openxmlformats.org/officeDocument/2006/relationships" xmlns:p14="http://schemas.microsoft.com/office/powerpoint/2010/main" xmlns:p15="http://schemas.microsoft.com/office/powerpoint/2012/main" xmlns:mc="http://schemas.openxmlformats.org/markup-compatibility/2006" type="twoObjOverTx" preserve="1">
-  <p:cSld name="Title, 2 Content over Content">
-    <p:spTree>
-      <p:nvGrpSpPr>
-        <p:cNvPr id="1" name=""/>
-        <p:cNvGrpSpPr/>
-        <p:nvPr/>
-      </p:nvGrpSpPr>
-      <p:grpSpPr>
-        <a:xfrm>
-          <a:off x="0" y="0"/>
-          <a:ext cx="0" cy="0"/>
-          <a:chOff x="0" y="0"/>
-          <a:chExt cx="0" cy="0"/>
-        </a:xfrm>
-      </p:grpSpPr>
-      <p:sp>
-        <p:nvSpPr>
-          <p:cNvPr id="63" name="PlaceHolder 1"/>
-          <p:cNvSpPr>
-            <a:spLocks noGrp="1"/>
-          </p:cNvSpPr>
-          <p:nvPr>
-            <p:ph type="title"/>
-          </p:nvPr>
-        </p:nvSpPr>
-        <p:spPr>
-          <a:xfrm>
-            <a:off x="1523880" y="1122480"/>
-            <a:ext cx="9143640" cy="2387160"/>
-          </a:xfrm>
-          <a:prstGeom prst="rect">
-            <a:avLst/>
-          </a:prstGeom>
-        </p:spPr>
-        <p:txBody>
-          <a:bodyPr lIns="0" rIns="0" tIns="0" bIns="0" anchor="ctr"/>
-          <a:p>
-            <a:endParaRPr b="0" lang="en-US" sz="1800" spc="-1" strike="noStrike">
-              <a:solidFill>
-                <a:srgbClr val="000000"/>
-              </a:solidFill>
-              <a:latin typeface="Calibri"/>
-            </a:endParaRPr>
-          </a:p>
-        </p:txBody>
-      </p:sp>
-      <p:sp>
-        <p:nvSpPr>
-          <p:cNvPr id="64" name="PlaceHolder 2"/>
-          <p:cNvSpPr>
-            <a:spLocks noGrp="1"/>
-          </p:cNvSpPr>
-          <p:nvPr>
-            <p:ph type="body"/>
-          </p:nvPr>
-        </p:nvSpPr>
-        <p:spPr>
-          <a:xfrm>
-            <a:off x="609480" y="1604520"/>
-            <a:ext cx="5354280" cy="1896840"/>
-          </a:xfrm>
-          <a:prstGeom prst="rect">
-            <a:avLst/>
-          </a:prstGeom>
-        </p:spPr>
-        <p:txBody>
-          <a:bodyPr lIns="0" rIns="0" tIns="0" bIns="0">
-            <a:normAutofit/>
-          </a:bodyPr>
-          <a:p>
-            <a:endParaRPr b="0" lang="en-US" sz="2800" spc="-1" strike="noStrike">
-              <a:solidFill>
-                <a:srgbClr val="000000"/>
-              </a:solidFill>
-              <a:latin typeface="Calibri"/>
-            </a:endParaRPr>
-          </a:p>
-        </p:txBody>
-      </p:sp>
-      <p:sp>
-        <p:nvSpPr>
-          <p:cNvPr id="65" name="PlaceHolder 3"/>
-          <p:cNvSpPr>
-            <a:spLocks noGrp="1"/>
-          </p:cNvSpPr>
-          <p:nvPr>
-            <p:ph type="body"/>
-          </p:nvPr>
-        </p:nvSpPr>
-        <p:spPr>
-          <a:xfrm>
-            <a:off x="6231960" y="1604520"/>
-            <a:ext cx="5354280" cy="1896840"/>
-          </a:xfrm>
-          <a:prstGeom prst="rect">
-            <a:avLst/>
-          </a:prstGeom>
-        </p:spPr>
-        <p:txBody>
-          <a:bodyPr lIns="0" rIns="0" tIns="0" bIns="0">
-            <a:normAutofit/>
-          </a:bodyPr>
-          <a:p>
-            <a:endParaRPr b="0" lang="en-US" sz="2800" spc="-1" strike="noStrike">
-              <a:solidFill>
-                <a:srgbClr val="000000"/>
-              </a:solidFill>
-              <a:latin typeface="Calibri"/>
-            </a:endParaRPr>
-          </a:p>
-        </p:txBody>
-      </p:sp>
-      <p:sp>
-        <p:nvSpPr>
-          <p:cNvPr id="66" name="PlaceHolder 4"/>
-          <p:cNvSpPr>
-            <a:spLocks noGrp="1"/>
-          </p:cNvSpPr>
-          <p:nvPr>
-            <p:ph type="body"/>
-          </p:nvPr>
-        </p:nvSpPr>
-        <p:spPr>
-          <a:xfrm>
-            <a:off x="609480" y="3682080"/>
-            <a:ext cx="10972440" cy="1896840"/>
-          </a:xfrm>
-          <a:prstGeom prst="rect">
-            <a:avLst/>
-          </a:prstGeom>
-        </p:spPr>
-        <p:txBody>
-          <a:bodyPr lIns="0" rIns="0" tIns="0" bIns="0">
-            <a:normAutofit/>
-          </a:bodyPr>
-          <a:p>
-            <a:endParaRPr b="0" lang="en-US" sz="2800" spc="-1" strike="noStrike">
-              <a:solidFill>
-                <a:srgbClr val="000000"/>
-              </a:solidFill>
-              <a:latin typeface="Calibri"/>
-            </a:endParaRPr>
-          </a:p>
-        </p:txBody>
-      </p:sp>
-    </p:spTree>
-  </p:cSld>
-</p:sldLayout>
-</file>
-
-<file path=ppt/slideLayouts/slideLayout22.xml><?xml version="1.0" encoding="utf-8"?>
-<p:sldLayout xmlns:a="http://schemas.openxmlformats.org/drawingml/2006/main" xmlns:p="http://schemas.openxmlformats.org/presentationml/2006/main" xmlns:r="http://schemas.openxmlformats.org/officeDocument/2006/relationships" xmlns:p14="http://schemas.microsoft.com/office/powerpoint/2010/main" xmlns:p15="http://schemas.microsoft.com/office/powerpoint/2012/main" xmlns:mc="http://schemas.openxmlformats.org/markup-compatibility/2006" type="objOverTx" preserve="1">
-  <p:cSld name="Title, Content over Content">
-    <p:spTree>
-      <p:nvGrpSpPr>
-        <p:cNvPr id="1" name=""/>
-        <p:cNvGrpSpPr/>
-        <p:nvPr/>
-      </p:nvGrpSpPr>
-      <p:grpSpPr>
-        <a:xfrm>
-          <a:off x="0" y="0"/>
-          <a:ext cx="0" cy="0"/>
-          <a:chOff x="0" y="0"/>
-          <a:chExt cx="0" cy="0"/>
-        </a:xfrm>
-      </p:grpSpPr>
-      <p:sp>
-        <p:nvSpPr>
-          <p:cNvPr id="67" name="PlaceHolder 1"/>
-          <p:cNvSpPr>
-            <a:spLocks noGrp="1"/>
-          </p:cNvSpPr>
-          <p:nvPr>
-            <p:ph type="title"/>
-          </p:nvPr>
-        </p:nvSpPr>
-        <p:spPr>
-          <a:xfrm>
-            <a:off x="1523880" y="1122480"/>
-            <a:ext cx="9143640" cy="2387160"/>
-          </a:xfrm>
-          <a:prstGeom prst="rect">
-            <a:avLst/>
-          </a:prstGeom>
-        </p:spPr>
-        <p:txBody>
-          <a:bodyPr lIns="0" rIns="0" tIns="0" bIns="0" anchor="ctr"/>
-          <a:p>
-            <a:endParaRPr b="0" lang="en-US" sz="1800" spc="-1" strike="noStrike">
-              <a:solidFill>
-                <a:srgbClr val="000000"/>
-              </a:solidFill>
-              <a:latin typeface="Calibri"/>
-            </a:endParaRPr>
-          </a:p>
-        </p:txBody>
-      </p:sp>
-      <p:sp>
-        <p:nvSpPr>
-          <p:cNvPr id="68" name="PlaceHolder 2"/>
-          <p:cNvSpPr>
-            <a:spLocks noGrp="1"/>
-          </p:cNvSpPr>
-          <p:nvPr>
-            <p:ph type="body"/>
-          </p:nvPr>
-        </p:nvSpPr>
-        <p:spPr>
-          <a:xfrm>
-            <a:off x="609480" y="1604520"/>
-            <a:ext cx="10972440" cy="1896840"/>
-          </a:xfrm>
-          <a:prstGeom prst="rect">
-            <a:avLst/>
-          </a:prstGeom>
-        </p:spPr>
-        <p:txBody>
-          <a:bodyPr lIns="0" rIns="0" tIns="0" bIns="0">
-            <a:normAutofit/>
-          </a:bodyPr>
-          <a:p>
-            <a:endParaRPr b="0" lang="en-US" sz="2800" spc="-1" strike="noStrike">
-              <a:solidFill>
-                <a:srgbClr val="000000"/>
-              </a:solidFill>
-              <a:latin typeface="Calibri"/>
-            </a:endParaRPr>
-          </a:p>
-        </p:txBody>
-      </p:sp>
-      <p:sp>
-        <p:nvSpPr>
-          <p:cNvPr id="69" name="PlaceHolder 3"/>
-          <p:cNvSpPr>
-            <a:spLocks noGrp="1"/>
-          </p:cNvSpPr>
-          <p:nvPr>
-            <p:ph type="body"/>
-          </p:nvPr>
-        </p:nvSpPr>
-        <p:spPr>
-          <a:xfrm>
-            <a:off x="609480" y="3682080"/>
-            <a:ext cx="10972440" cy="1896840"/>
-          </a:xfrm>
-          <a:prstGeom prst="rect">
-            <a:avLst/>
-          </a:prstGeom>
-        </p:spPr>
-        <p:txBody>
-          <a:bodyPr lIns="0" rIns="0" tIns="0" bIns="0">
-            <a:normAutofit/>
-          </a:bodyPr>
-          <a:p>
-            <a:endParaRPr b="0" lang="en-US" sz="2800" spc="-1" strike="noStrike">
-              <a:solidFill>
-                <a:srgbClr val="000000"/>
-              </a:solidFill>
-              <a:latin typeface="Calibri"/>
-            </a:endParaRPr>
-          </a:p>
-        </p:txBody>
-      </p:sp>
-    </p:spTree>
-  </p:cSld>
-</p:sldLayout>
-</file>
-
-<file path=ppt/slideLayouts/slideLayout23.xml><?xml version="1.0" encoding="utf-8"?>
-<p:sldLayout xmlns:a="http://schemas.openxmlformats.org/drawingml/2006/main" xmlns:p="http://schemas.openxmlformats.org/presentationml/2006/main" xmlns:r="http://schemas.openxmlformats.org/officeDocument/2006/relationships" xmlns:p14="http://schemas.microsoft.com/office/powerpoint/2010/main" xmlns:p15="http://schemas.microsoft.com/office/powerpoint/2012/main" xmlns:mc="http://schemas.openxmlformats.org/markup-compatibility/2006" type="fourObj" preserve="1">
-  <p:cSld name="Title, 4 Content">
-    <p:spTree>
-      <p:nvGrpSpPr>
-        <p:cNvPr id="1" name=""/>
-        <p:cNvGrpSpPr/>
-        <p:nvPr/>
-      </p:nvGrpSpPr>
-      <p:grpSpPr>
-        <a:xfrm>
-          <a:off x="0" y="0"/>
-          <a:ext cx="0" cy="0"/>
-          <a:chOff x="0" y="0"/>
-          <a:chExt cx="0" cy="0"/>
-        </a:xfrm>
-      </p:grpSpPr>
-      <p:sp>
-        <p:nvSpPr>
-          <p:cNvPr id="70" name="PlaceHolder 1"/>
-          <p:cNvSpPr>
-            <a:spLocks noGrp="1"/>
-          </p:cNvSpPr>
-          <p:nvPr>
-            <p:ph type="title"/>
-          </p:nvPr>
-        </p:nvSpPr>
-        <p:spPr>
-          <a:xfrm>
-            <a:off x="1523880" y="1122480"/>
-            <a:ext cx="9143640" cy="2387160"/>
-          </a:xfrm>
-          <a:prstGeom prst="rect">
-            <a:avLst/>
-          </a:prstGeom>
-        </p:spPr>
-        <p:txBody>
-          <a:bodyPr lIns="0" rIns="0" tIns="0" bIns="0" anchor="ctr"/>
-          <a:p>
-            <a:endParaRPr b="0" lang="en-US" sz="1800" spc="-1" strike="noStrike">
-              <a:solidFill>
-                <a:srgbClr val="000000"/>
-              </a:solidFill>
-              <a:latin typeface="Calibri"/>
-            </a:endParaRPr>
-          </a:p>
-        </p:txBody>
-      </p:sp>
-      <p:sp>
-        <p:nvSpPr>
-          <p:cNvPr id="71" name="PlaceHolder 2"/>
-          <p:cNvSpPr>
-            <a:spLocks noGrp="1"/>
-          </p:cNvSpPr>
-          <p:nvPr>
-            <p:ph type="body"/>
-          </p:nvPr>
-        </p:nvSpPr>
-        <p:spPr>
-          <a:xfrm>
-            <a:off x="609480" y="1604520"/>
-            <a:ext cx="5354280" cy="1896840"/>
-          </a:xfrm>
-          <a:prstGeom prst="rect">
-            <a:avLst/>
-          </a:prstGeom>
-        </p:spPr>
-        <p:txBody>
-          <a:bodyPr lIns="0" rIns="0" tIns="0" bIns="0">
-            <a:normAutofit/>
-          </a:bodyPr>
-          <a:p>
-            <a:endParaRPr b="0" lang="en-US" sz="2800" spc="-1" strike="noStrike">
-              <a:solidFill>
-                <a:srgbClr val="000000"/>
-              </a:solidFill>
-              <a:latin typeface="Calibri"/>
-            </a:endParaRPr>
-          </a:p>
-        </p:txBody>
-      </p:sp>
-      <p:sp>
-        <p:nvSpPr>
-          <p:cNvPr id="72" name="PlaceHolder 3"/>
-          <p:cNvSpPr>
-            <a:spLocks noGrp="1"/>
-          </p:cNvSpPr>
-          <p:nvPr>
-            <p:ph type="body"/>
-          </p:nvPr>
-        </p:nvSpPr>
-        <p:spPr>
-          <a:xfrm>
-            <a:off x="6231960" y="1604520"/>
-            <a:ext cx="5354280" cy="1896840"/>
-          </a:xfrm>
-          <a:prstGeom prst="rect">
-            <a:avLst/>
-          </a:prstGeom>
-        </p:spPr>
-        <p:txBody>
-          <a:bodyPr lIns="0" rIns="0" tIns="0" bIns="0">
-            <a:normAutofit/>
-          </a:bodyPr>
-          <a:p>
-            <a:endParaRPr b="0" lang="en-US" sz="2800" spc="-1" strike="noStrike">
-              <a:solidFill>
-                <a:srgbClr val="000000"/>
-              </a:solidFill>
-              <a:latin typeface="Calibri"/>
-            </a:endParaRPr>
-          </a:p>
-        </p:txBody>
-      </p:sp>
-      <p:sp>
-        <p:nvSpPr>
-          <p:cNvPr id="73" name="PlaceHolder 4"/>
-          <p:cNvSpPr>
-            <a:spLocks noGrp="1"/>
-          </p:cNvSpPr>
-          <p:nvPr>
-            <p:ph type="body"/>
-          </p:nvPr>
-        </p:nvSpPr>
-        <p:spPr>
-          <a:xfrm>
-            <a:off x="609480" y="3682080"/>
-            <a:ext cx="5354280" cy="1896840"/>
-          </a:xfrm>
-          <a:prstGeom prst="rect">
-            <a:avLst/>
-          </a:prstGeom>
-        </p:spPr>
-        <p:txBody>
-          <a:bodyPr lIns="0" rIns="0" tIns="0" bIns="0">
-            <a:normAutofit/>
-          </a:bodyPr>
-          <a:p>
-            <a:endParaRPr b="0" lang="en-US" sz="2800" spc="-1" strike="noStrike">
-              <a:solidFill>
-                <a:srgbClr val="000000"/>
-              </a:solidFill>
-              <a:latin typeface="Calibri"/>
-            </a:endParaRPr>
-          </a:p>
-        </p:txBody>
-      </p:sp>
-      <p:sp>
-        <p:nvSpPr>
-          <p:cNvPr id="74" name="PlaceHolder 5"/>
-          <p:cNvSpPr>
-            <a:spLocks noGrp="1"/>
-          </p:cNvSpPr>
-          <p:nvPr>
-            <p:ph type="body"/>
-          </p:nvPr>
-        </p:nvSpPr>
-        <p:spPr>
-          <a:xfrm>
-            <a:off x="6231960" y="3682080"/>
-            <a:ext cx="5354280" cy="1896840"/>
-          </a:xfrm>
-          <a:prstGeom prst="rect">
-            <a:avLst/>
-          </a:prstGeom>
-        </p:spPr>
-        <p:txBody>
-          <a:bodyPr lIns="0" rIns="0" tIns="0" bIns="0">
-            <a:normAutofit/>
-          </a:bodyPr>
-          <a:p>
-            <a:endParaRPr b="0" lang="en-US" sz="2800" spc="-1" strike="noStrike">
-              <a:solidFill>
-                <a:srgbClr val="000000"/>
-              </a:solidFill>
-              <a:latin typeface="Calibri"/>
-            </a:endParaRPr>
-          </a:p>
-        </p:txBody>
-      </p:sp>
-    </p:spTree>
-  </p:cSld>
-</p:sldLayout>
-</file>
-
-<file path=ppt/slideLayouts/slideLayout24.xml><?xml version="1.0" encoding="utf-8"?>
-<p:sldLayout xmlns:a="http://schemas.openxmlformats.org/drawingml/2006/main" xmlns:p="http://schemas.openxmlformats.org/presentationml/2006/main" xmlns:r="http://schemas.openxmlformats.org/officeDocument/2006/relationships" xmlns:p14="http://schemas.microsoft.com/office/powerpoint/2010/main" xmlns:p15="http://schemas.microsoft.com/office/powerpoint/2012/main" xmlns:mc="http://schemas.openxmlformats.org/markup-compatibility/2006" type="blank" preserve="1">
-  <p:cSld name="Title, 6 Content">
-    <p:spTree>
-      <p:nvGrpSpPr>
-        <p:cNvPr id="1" name=""/>
-        <p:cNvGrpSpPr/>
-        <p:nvPr/>
-      </p:nvGrpSpPr>
-      <p:grpSpPr>
-        <a:xfrm>
-          <a:off x="0" y="0"/>
-          <a:ext cx="0" cy="0"/>
-          <a:chOff x="0" y="0"/>
-          <a:chExt cx="0" cy="0"/>
-        </a:xfrm>
-      </p:grpSpPr>
-      <p:sp>
-        <p:nvSpPr>
-          <p:cNvPr id="75" name="PlaceHolder 1"/>
-          <p:cNvSpPr>
-            <a:spLocks noGrp="1"/>
-          </p:cNvSpPr>
-          <p:nvPr>
-            <p:ph type="title"/>
-          </p:nvPr>
-        </p:nvSpPr>
-        <p:spPr>
-          <a:xfrm>
-            <a:off x="1523880" y="1122480"/>
-            <a:ext cx="9143640" cy="2387160"/>
-          </a:xfrm>
-          <a:prstGeom prst="rect">
-            <a:avLst/>
-          </a:prstGeom>
-        </p:spPr>
-        <p:txBody>
-          <a:bodyPr lIns="0" rIns="0" tIns="0" bIns="0" anchor="ctr"/>
-          <a:p>
-            <a:endParaRPr b="0" lang="en-US" sz="1800" spc="-1" strike="noStrike">
-              <a:solidFill>
-                <a:srgbClr val="000000"/>
-              </a:solidFill>
-              <a:latin typeface="Calibri"/>
-            </a:endParaRPr>
-          </a:p>
-        </p:txBody>
-      </p:sp>
-      <p:sp>
-        <p:nvSpPr>
-          <p:cNvPr id="76" name="PlaceHolder 2"/>
-          <p:cNvSpPr>
-            <a:spLocks noGrp="1"/>
-          </p:cNvSpPr>
-          <p:nvPr>
-            <p:ph type="body"/>
-          </p:nvPr>
-        </p:nvSpPr>
-        <p:spPr>
-          <a:xfrm>
-            <a:off x="609480" y="1604520"/>
-            <a:ext cx="3533040" cy="1896840"/>
-          </a:xfrm>
-          <a:prstGeom prst="rect">
-            <a:avLst/>
-          </a:prstGeom>
-        </p:spPr>
-        <p:txBody>
-          <a:bodyPr lIns="0" rIns="0" tIns="0" bIns="0">
-            <a:normAutofit/>
-          </a:bodyPr>
-          <a:p>
-            <a:endParaRPr b="0" lang="en-US" sz="2800" spc="-1" strike="noStrike">
-              <a:solidFill>
-                <a:srgbClr val="000000"/>
-              </a:solidFill>
-              <a:latin typeface="Calibri"/>
-            </a:endParaRPr>
-          </a:p>
-        </p:txBody>
-      </p:sp>
-      <p:sp>
-        <p:nvSpPr>
-          <p:cNvPr id="77" name="PlaceHolder 3"/>
-          <p:cNvSpPr>
-            <a:spLocks noGrp="1"/>
-          </p:cNvSpPr>
-          <p:nvPr>
-            <p:ph type="body"/>
-          </p:nvPr>
-        </p:nvSpPr>
-        <p:spPr>
-          <a:xfrm>
-            <a:off x="4319640" y="1604520"/>
-            <a:ext cx="3533040" cy="1896840"/>
-          </a:xfrm>
-          <a:prstGeom prst="rect">
-            <a:avLst/>
-          </a:prstGeom>
-        </p:spPr>
-        <p:txBody>
-          <a:bodyPr lIns="0" rIns="0" tIns="0" bIns="0">
-            <a:normAutofit/>
-          </a:bodyPr>
-          <a:p>
-            <a:endParaRPr b="0" lang="en-US" sz="2800" spc="-1" strike="noStrike">
-              <a:solidFill>
-                <a:srgbClr val="000000"/>
-              </a:solidFill>
-              <a:latin typeface="Calibri"/>
-            </a:endParaRPr>
-          </a:p>
-        </p:txBody>
-      </p:sp>
-      <p:sp>
-        <p:nvSpPr>
-          <p:cNvPr id="78" name="PlaceHolder 4"/>
-          <p:cNvSpPr>
-            <a:spLocks noGrp="1"/>
-          </p:cNvSpPr>
-          <p:nvPr>
-            <p:ph type="body"/>
-          </p:nvPr>
-        </p:nvSpPr>
-        <p:spPr>
-          <a:xfrm>
-            <a:off x="8029800" y="1604520"/>
-            <a:ext cx="3533040" cy="1896840"/>
-          </a:xfrm>
-          <a:prstGeom prst="rect">
-            <a:avLst/>
-          </a:prstGeom>
-        </p:spPr>
-        <p:txBody>
-          <a:bodyPr lIns="0" rIns="0" tIns="0" bIns="0">
-            <a:normAutofit/>
-          </a:bodyPr>
-          <a:p>
-            <a:endParaRPr b="0" lang="en-US" sz="2800" spc="-1" strike="noStrike">
-              <a:solidFill>
-                <a:srgbClr val="000000"/>
-              </a:solidFill>
-              <a:latin typeface="Calibri"/>
-            </a:endParaRPr>
-          </a:p>
-        </p:txBody>
-      </p:sp>
-      <p:sp>
-        <p:nvSpPr>
-          <p:cNvPr id="79" name="PlaceHolder 5"/>
-          <p:cNvSpPr>
-            <a:spLocks noGrp="1"/>
-          </p:cNvSpPr>
-          <p:nvPr>
-            <p:ph type="body"/>
-          </p:nvPr>
-        </p:nvSpPr>
-        <p:spPr>
-          <a:xfrm>
-            <a:off x="609480" y="3682080"/>
-            <a:ext cx="3533040" cy="1896840"/>
-          </a:xfrm>
-          <a:prstGeom prst="rect">
-            <a:avLst/>
-          </a:prstGeom>
-        </p:spPr>
-        <p:txBody>
-          <a:bodyPr lIns="0" rIns="0" tIns="0" bIns="0">
-            <a:normAutofit/>
-          </a:bodyPr>
-          <a:p>
-            <a:endParaRPr b="0" lang="en-US" sz="2800" spc="-1" strike="noStrike">
-              <a:solidFill>
-                <a:srgbClr val="000000"/>
-              </a:solidFill>
-              <a:latin typeface="Calibri"/>
-            </a:endParaRPr>
-          </a:p>
-        </p:txBody>
-      </p:sp>
-      <p:sp>
-        <p:nvSpPr>
-          <p:cNvPr id="80" name="PlaceHolder 6"/>
-          <p:cNvSpPr>
-            <a:spLocks noGrp="1"/>
-          </p:cNvSpPr>
-          <p:nvPr>
-            <p:ph type="body"/>
-          </p:nvPr>
-        </p:nvSpPr>
-        <p:spPr>
-          <a:xfrm>
-            <a:off x="4319640" y="3682080"/>
-            <a:ext cx="3533040" cy="1896840"/>
-          </a:xfrm>
-          <a:prstGeom prst="rect">
-            <a:avLst/>
-          </a:prstGeom>
-        </p:spPr>
-        <p:txBody>
-          <a:bodyPr lIns="0" rIns="0" tIns="0" bIns="0">
-            <a:normAutofit/>
-          </a:bodyPr>
-          <a:p>
-            <a:endParaRPr b="0" lang="en-US" sz="2800" spc="-1" strike="noStrike">
-              <a:solidFill>
-                <a:srgbClr val="000000"/>
-              </a:solidFill>
-              <a:latin typeface="Calibri"/>
-            </a:endParaRPr>
-          </a:p>
-        </p:txBody>
-      </p:sp>
-      <p:sp>
-        <p:nvSpPr>
-          <p:cNvPr id="81" name="PlaceHolder 7"/>
-          <p:cNvSpPr>
-            <a:spLocks noGrp="1"/>
-          </p:cNvSpPr>
-          <p:nvPr>
-            <p:ph type="body"/>
-          </p:nvPr>
-        </p:nvSpPr>
-        <p:spPr>
-          <a:xfrm>
-            <a:off x="8029800" y="3682080"/>
-            <a:ext cx="3533040" cy="1896840"/>
-          </a:xfrm>
-          <a:prstGeom prst="rect">
-            <a:avLst/>
-          </a:prstGeom>
-        </p:spPr>
-        <p:txBody>
-          <a:bodyPr lIns="0" rIns="0" tIns="0" bIns="0">
-            <a:normAutofit/>
-          </a:bodyPr>
-          <a:p>
-            <a:endParaRPr b="0" lang="en-US" sz="2800" spc="-1" strike="noStrike">
-              <a:solidFill>
-                <a:srgbClr val="000000"/>
-              </a:solidFill>
-              <a:latin typeface="Calibri"/>
             </a:endParaRPr>
           </a:p>
         </p:txBody>
@@ -2115,7 +646,7 @@
       </p:grpSpPr>
       <p:sp>
         <p:nvSpPr>
-          <p:cNvPr id="7" name="PlaceHolder 1"/>
+          <p:cNvPr id="3" name="PlaceHolder 1"/>
           <p:cNvSpPr>
             <a:spLocks noGrp="1"/>
           </p:cNvSpPr>
@@ -2126,7 +657,7 @@
         <p:spPr>
           <a:xfrm>
             <a:off x="1523880" y="1122480"/>
-            <a:ext cx="9143640" cy="2387160"/>
+            <a:ext cx="9143280" cy="2386800"/>
           </a:xfrm>
           <a:prstGeom prst="rect">
             <a:avLst/>
@@ -2135,18 +666,16 @@
         <p:txBody>
           <a:bodyPr lIns="0" rIns="0" tIns="0" bIns="0" anchor="ctr"/>
           <a:p>
-            <a:endParaRPr b="0" lang="en-US" sz="1800" spc="-1" strike="noStrike">
-              <a:solidFill>
-                <a:srgbClr val="000000"/>
-              </a:solidFill>
-              <a:latin typeface="Calibri"/>
+            <a:pPr algn="ctr"/>
+            <a:endParaRPr b="0" lang="en-IN" sz="4400" spc="-1" strike="noStrike">
+              <a:latin typeface="Arial"/>
             </a:endParaRPr>
           </a:p>
         </p:txBody>
       </p:sp>
       <p:sp>
         <p:nvSpPr>
-          <p:cNvPr id="8" name="PlaceHolder 2"/>
+          <p:cNvPr id="4" name="PlaceHolder 2"/>
           <p:cNvSpPr>
             <a:spLocks noGrp="1"/>
           </p:cNvSpPr>
@@ -2168,11 +697,8 @@
             <a:normAutofit/>
           </a:bodyPr>
           <a:p>
-            <a:endParaRPr b="0" lang="en-US" sz="2800" spc="-1" strike="noStrike">
-              <a:solidFill>
-                <a:srgbClr val="000000"/>
-              </a:solidFill>
-              <a:latin typeface="Calibri"/>
+            <a:endParaRPr b="0" lang="en-IN" sz="3200" spc="-1" strike="noStrike">
+              <a:latin typeface="Arial"/>
             </a:endParaRPr>
           </a:p>
         </p:txBody>
@@ -2201,7 +727,7 @@
       </p:grpSpPr>
       <p:sp>
         <p:nvSpPr>
-          <p:cNvPr id="9" name="PlaceHolder 1"/>
+          <p:cNvPr id="5" name="PlaceHolder 1"/>
           <p:cNvSpPr>
             <a:spLocks noGrp="1"/>
           </p:cNvSpPr>
@@ -2212,7 +738,7 @@
         <p:spPr>
           <a:xfrm>
             <a:off x="1523880" y="1122480"/>
-            <a:ext cx="9143640" cy="2387160"/>
+            <a:ext cx="9143280" cy="2386800"/>
           </a:xfrm>
           <a:prstGeom prst="rect">
             <a:avLst/>
@@ -2221,18 +747,16 @@
         <p:txBody>
           <a:bodyPr lIns="0" rIns="0" tIns="0" bIns="0" anchor="ctr"/>
           <a:p>
-            <a:endParaRPr b="0" lang="en-US" sz="1800" spc="-1" strike="noStrike">
-              <a:solidFill>
-                <a:srgbClr val="000000"/>
-              </a:solidFill>
-              <a:latin typeface="Calibri"/>
+            <a:pPr algn="ctr"/>
+            <a:endParaRPr b="0" lang="en-IN" sz="4400" spc="-1" strike="noStrike">
+              <a:latin typeface="Arial"/>
             </a:endParaRPr>
           </a:p>
         </p:txBody>
       </p:sp>
       <p:sp>
         <p:nvSpPr>
-          <p:cNvPr id="10" name="PlaceHolder 2"/>
+          <p:cNvPr id="6" name="PlaceHolder 2"/>
           <p:cNvSpPr>
             <a:spLocks noGrp="1"/>
           </p:cNvSpPr>
@@ -2254,18 +778,15 @@
             <a:normAutofit/>
           </a:bodyPr>
           <a:p>
-            <a:endParaRPr b="0" lang="en-US" sz="2800" spc="-1" strike="noStrike">
-              <a:solidFill>
-                <a:srgbClr val="000000"/>
-              </a:solidFill>
-              <a:latin typeface="Calibri"/>
+            <a:endParaRPr b="0" lang="en-IN" sz="3200" spc="-1" strike="noStrike">
+              <a:latin typeface="Arial"/>
             </a:endParaRPr>
           </a:p>
         </p:txBody>
       </p:sp>
       <p:sp>
         <p:nvSpPr>
-          <p:cNvPr id="11" name="PlaceHolder 3"/>
+          <p:cNvPr id="7" name="PlaceHolder 3"/>
           <p:cNvSpPr>
             <a:spLocks noGrp="1"/>
           </p:cNvSpPr>
@@ -2287,11 +808,8 @@
             <a:normAutofit/>
           </a:bodyPr>
           <a:p>
-            <a:endParaRPr b="0" lang="en-US" sz="2800" spc="-1" strike="noStrike">
-              <a:solidFill>
-                <a:srgbClr val="000000"/>
-              </a:solidFill>
-              <a:latin typeface="Calibri"/>
+            <a:endParaRPr b="0" lang="en-IN" sz="3200" spc="-1" strike="noStrike">
+              <a:latin typeface="Arial"/>
             </a:endParaRPr>
           </a:p>
         </p:txBody>
@@ -2320,7 +838,7 @@
       </p:grpSpPr>
       <p:sp>
         <p:nvSpPr>
-          <p:cNvPr id="12" name="PlaceHolder 1"/>
+          <p:cNvPr id="8" name="PlaceHolder 1"/>
           <p:cNvSpPr>
             <a:spLocks noGrp="1"/>
           </p:cNvSpPr>
@@ -2331,7 +849,7 @@
         <p:spPr>
           <a:xfrm>
             <a:off x="1523880" y="1122480"/>
-            <a:ext cx="9143640" cy="2387160"/>
+            <a:ext cx="9143280" cy="2386800"/>
           </a:xfrm>
           <a:prstGeom prst="rect">
             <a:avLst/>
@@ -2340,11 +858,9 @@
         <p:txBody>
           <a:bodyPr lIns="0" rIns="0" tIns="0" bIns="0" anchor="ctr"/>
           <a:p>
-            <a:endParaRPr b="0" lang="en-US" sz="1800" spc="-1" strike="noStrike">
-              <a:solidFill>
-                <a:srgbClr val="000000"/>
-              </a:solidFill>
-              <a:latin typeface="Calibri"/>
+            <a:pPr algn="ctr"/>
+            <a:endParaRPr b="0" lang="en-IN" sz="4400" spc="-1" strike="noStrike">
+              <a:latin typeface="Arial"/>
             </a:endParaRPr>
           </a:p>
         </p:txBody>
@@ -2373,7 +889,7 @@
       </p:grpSpPr>
       <p:sp>
         <p:nvSpPr>
-          <p:cNvPr id="13" name="PlaceHolder 1"/>
+          <p:cNvPr id="9" name="PlaceHolder 1"/>
           <p:cNvSpPr>
             <a:spLocks noGrp="1"/>
           </p:cNvSpPr>
@@ -2384,7 +900,7 @@
         <p:spPr>
           <a:xfrm>
             <a:off x="1523880" y="1122480"/>
-            <a:ext cx="9143640" cy="11066760"/>
+            <a:ext cx="9143280" cy="11064960"/>
           </a:xfrm>
           <a:prstGeom prst="rect">
             <a:avLst/>
@@ -2424,7 +940,7 @@
       </p:grpSpPr>
       <p:sp>
         <p:nvSpPr>
-          <p:cNvPr id="14" name="PlaceHolder 1"/>
+          <p:cNvPr id="10" name="PlaceHolder 1"/>
           <p:cNvSpPr>
             <a:spLocks noGrp="1"/>
           </p:cNvSpPr>
@@ -2435,7 +951,7 @@
         <p:spPr>
           <a:xfrm>
             <a:off x="1523880" y="1122480"/>
-            <a:ext cx="9143640" cy="2387160"/>
+            <a:ext cx="9143280" cy="2386800"/>
           </a:xfrm>
           <a:prstGeom prst="rect">
             <a:avLst/>
@@ -2444,18 +960,16 @@
         <p:txBody>
           <a:bodyPr lIns="0" rIns="0" tIns="0" bIns="0" anchor="ctr"/>
           <a:p>
-            <a:endParaRPr b="0" lang="en-US" sz="1800" spc="-1" strike="noStrike">
-              <a:solidFill>
-                <a:srgbClr val="000000"/>
-              </a:solidFill>
-              <a:latin typeface="Calibri"/>
+            <a:pPr algn="ctr"/>
+            <a:endParaRPr b="0" lang="en-IN" sz="4400" spc="-1" strike="noStrike">
+              <a:latin typeface="Arial"/>
             </a:endParaRPr>
           </a:p>
         </p:txBody>
       </p:sp>
       <p:sp>
         <p:nvSpPr>
-          <p:cNvPr id="15" name="PlaceHolder 2"/>
+          <p:cNvPr id="11" name="PlaceHolder 2"/>
           <p:cNvSpPr>
             <a:spLocks noGrp="1"/>
           </p:cNvSpPr>
@@ -2477,18 +991,15 @@
             <a:normAutofit/>
           </a:bodyPr>
           <a:p>
-            <a:endParaRPr b="0" lang="en-US" sz="2800" spc="-1" strike="noStrike">
-              <a:solidFill>
-                <a:srgbClr val="000000"/>
-              </a:solidFill>
-              <a:latin typeface="Calibri"/>
+            <a:endParaRPr b="0" lang="en-IN" sz="3200" spc="-1" strike="noStrike">
+              <a:latin typeface="Arial"/>
             </a:endParaRPr>
           </a:p>
         </p:txBody>
       </p:sp>
       <p:sp>
         <p:nvSpPr>
-          <p:cNvPr id="16" name="PlaceHolder 3"/>
+          <p:cNvPr id="12" name="PlaceHolder 3"/>
           <p:cNvSpPr>
             <a:spLocks noGrp="1"/>
           </p:cNvSpPr>
@@ -2510,18 +1021,15 @@
             <a:normAutofit/>
           </a:bodyPr>
           <a:p>
-            <a:endParaRPr b="0" lang="en-US" sz="2800" spc="-1" strike="noStrike">
-              <a:solidFill>
-                <a:srgbClr val="000000"/>
-              </a:solidFill>
-              <a:latin typeface="Calibri"/>
+            <a:endParaRPr b="0" lang="en-IN" sz="3200" spc="-1" strike="noStrike">
+              <a:latin typeface="Arial"/>
             </a:endParaRPr>
           </a:p>
         </p:txBody>
       </p:sp>
       <p:sp>
         <p:nvSpPr>
-          <p:cNvPr id="17" name="PlaceHolder 4"/>
+          <p:cNvPr id="13" name="PlaceHolder 4"/>
           <p:cNvSpPr>
             <a:spLocks noGrp="1"/>
           </p:cNvSpPr>
@@ -2543,11 +1051,8 @@
             <a:normAutofit/>
           </a:bodyPr>
           <a:p>
-            <a:endParaRPr b="0" lang="en-US" sz="2800" spc="-1" strike="noStrike">
-              <a:solidFill>
-                <a:srgbClr val="000000"/>
-              </a:solidFill>
-              <a:latin typeface="Calibri"/>
+            <a:endParaRPr b="0" lang="en-IN" sz="3200" spc="-1" strike="noStrike">
+              <a:latin typeface="Arial"/>
             </a:endParaRPr>
           </a:p>
         </p:txBody>
@@ -2576,7 +1081,7 @@
       </p:grpSpPr>
       <p:sp>
         <p:nvSpPr>
-          <p:cNvPr id="18" name="PlaceHolder 1"/>
+          <p:cNvPr id="14" name="PlaceHolder 1"/>
           <p:cNvSpPr>
             <a:spLocks noGrp="1"/>
           </p:cNvSpPr>
@@ -2587,7 +1092,7 @@
         <p:spPr>
           <a:xfrm>
             <a:off x="1523880" y="1122480"/>
-            <a:ext cx="9143640" cy="2387160"/>
+            <a:ext cx="9143280" cy="2386800"/>
           </a:xfrm>
           <a:prstGeom prst="rect">
             <a:avLst/>
@@ -2596,18 +1101,16 @@
         <p:txBody>
           <a:bodyPr lIns="0" rIns="0" tIns="0" bIns="0" anchor="ctr"/>
           <a:p>
-            <a:endParaRPr b="0" lang="en-US" sz="1800" spc="-1" strike="noStrike">
-              <a:solidFill>
-                <a:srgbClr val="000000"/>
-              </a:solidFill>
-              <a:latin typeface="Calibri"/>
+            <a:pPr algn="ctr"/>
+            <a:endParaRPr b="0" lang="en-IN" sz="4400" spc="-1" strike="noStrike">
+              <a:latin typeface="Arial"/>
             </a:endParaRPr>
           </a:p>
         </p:txBody>
       </p:sp>
       <p:sp>
         <p:nvSpPr>
-          <p:cNvPr id="19" name="PlaceHolder 2"/>
+          <p:cNvPr id="15" name="PlaceHolder 2"/>
           <p:cNvSpPr>
             <a:spLocks noGrp="1"/>
           </p:cNvSpPr>
@@ -2629,18 +1132,15 @@
             <a:normAutofit/>
           </a:bodyPr>
           <a:p>
-            <a:endParaRPr b="0" lang="en-US" sz="2800" spc="-1" strike="noStrike">
-              <a:solidFill>
-                <a:srgbClr val="000000"/>
-              </a:solidFill>
-              <a:latin typeface="Calibri"/>
+            <a:endParaRPr b="0" lang="en-IN" sz="3200" spc="-1" strike="noStrike">
+              <a:latin typeface="Arial"/>
             </a:endParaRPr>
           </a:p>
         </p:txBody>
       </p:sp>
       <p:sp>
         <p:nvSpPr>
-          <p:cNvPr id="20" name="PlaceHolder 3"/>
+          <p:cNvPr id="16" name="PlaceHolder 3"/>
           <p:cNvSpPr>
             <a:spLocks noGrp="1"/>
           </p:cNvSpPr>
@@ -2662,18 +1162,15 @@
             <a:normAutofit/>
           </a:bodyPr>
           <a:p>
-            <a:endParaRPr b="0" lang="en-US" sz="2800" spc="-1" strike="noStrike">
-              <a:solidFill>
-                <a:srgbClr val="000000"/>
-              </a:solidFill>
-              <a:latin typeface="Calibri"/>
+            <a:endParaRPr b="0" lang="en-IN" sz="3200" spc="-1" strike="noStrike">
+              <a:latin typeface="Arial"/>
             </a:endParaRPr>
           </a:p>
         </p:txBody>
       </p:sp>
       <p:sp>
         <p:nvSpPr>
-          <p:cNvPr id="21" name="PlaceHolder 4"/>
+          <p:cNvPr id="17" name="PlaceHolder 4"/>
           <p:cNvSpPr>
             <a:spLocks noGrp="1"/>
           </p:cNvSpPr>
@@ -2695,11 +1192,8 @@
             <a:normAutofit/>
           </a:bodyPr>
           <a:p>
-            <a:endParaRPr b="0" lang="en-US" sz="2800" spc="-1" strike="noStrike">
-              <a:solidFill>
-                <a:srgbClr val="000000"/>
-              </a:solidFill>
-              <a:latin typeface="Calibri"/>
+            <a:endParaRPr b="0" lang="en-IN" sz="3200" spc="-1" strike="noStrike">
+              <a:latin typeface="Arial"/>
             </a:endParaRPr>
           </a:p>
         </p:txBody>
@@ -2728,7 +1222,7 @@
       </p:grpSpPr>
       <p:sp>
         <p:nvSpPr>
-          <p:cNvPr id="22" name="PlaceHolder 1"/>
+          <p:cNvPr id="18" name="PlaceHolder 1"/>
           <p:cNvSpPr>
             <a:spLocks noGrp="1"/>
           </p:cNvSpPr>
@@ -2739,7 +1233,7 @@
         <p:spPr>
           <a:xfrm>
             <a:off x="1523880" y="1122480"/>
-            <a:ext cx="9143640" cy="2387160"/>
+            <a:ext cx="9143280" cy="2386800"/>
           </a:xfrm>
           <a:prstGeom prst="rect">
             <a:avLst/>
@@ -2748,18 +1242,16 @@
         <p:txBody>
           <a:bodyPr lIns="0" rIns="0" tIns="0" bIns="0" anchor="ctr"/>
           <a:p>
-            <a:endParaRPr b="0" lang="en-US" sz="1800" spc="-1" strike="noStrike">
-              <a:solidFill>
-                <a:srgbClr val="000000"/>
-              </a:solidFill>
-              <a:latin typeface="Calibri"/>
+            <a:pPr algn="ctr"/>
+            <a:endParaRPr b="0" lang="en-IN" sz="4400" spc="-1" strike="noStrike">
+              <a:latin typeface="Arial"/>
             </a:endParaRPr>
           </a:p>
         </p:txBody>
       </p:sp>
       <p:sp>
         <p:nvSpPr>
-          <p:cNvPr id="23" name="PlaceHolder 2"/>
+          <p:cNvPr id="19" name="PlaceHolder 2"/>
           <p:cNvSpPr>
             <a:spLocks noGrp="1"/>
           </p:cNvSpPr>
@@ -2781,18 +1273,15 @@
             <a:normAutofit/>
           </a:bodyPr>
           <a:p>
-            <a:endParaRPr b="0" lang="en-US" sz="2800" spc="-1" strike="noStrike">
-              <a:solidFill>
-                <a:srgbClr val="000000"/>
-              </a:solidFill>
-              <a:latin typeface="Calibri"/>
+            <a:endParaRPr b="0" lang="en-IN" sz="3200" spc="-1" strike="noStrike">
+              <a:latin typeface="Arial"/>
             </a:endParaRPr>
           </a:p>
         </p:txBody>
       </p:sp>
       <p:sp>
         <p:nvSpPr>
-          <p:cNvPr id="24" name="PlaceHolder 3"/>
+          <p:cNvPr id="20" name="PlaceHolder 3"/>
           <p:cNvSpPr>
             <a:spLocks noGrp="1"/>
           </p:cNvSpPr>
@@ -2814,18 +1303,15 @@
             <a:normAutofit/>
           </a:bodyPr>
           <a:p>
-            <a:endParaRPr b="0" lang="en-US" sz="2800" spc="-1" strike="noStrike">
-              <a:solidFill>
-                <a:srgbClr val="000000"/>
-              </a:solidFill>
-              <a:latin typeface="Calibri"/>
+            <a:endParaRPr b="0" lang="en-IN" sz="3200" spc="-1" strike="noStrike">
+              <a:latin typeface="Arial"/>
             </a:endParaRPr>
           </a:p>
         </p:txBody>
       </p:sp>
       <p:sp>
         <p:nvSpPr>
-          <p:cNvPr id="25" name="PlaceHolder 4"/>
+          <p:cNvPr id="21" name="PlaceHolder 4"/>
           <p:cNvSpPr>
             <a:spLocks noGrp="1"/>
           </p:cNvSpPr>
@@ -2847,11 +1333,8 @@
             <a:normAutofit/>
           </a:bodyPr>
           <a:p>
-            <a:endParaRPr b="0" lang="en-US" sz="2800" spc="-1" strike="noStrike">
-              <a:solidFill>
-                <a:srgbClr val="000000"/>
-              </a:solidFill>
-              <a:latin typeface="Calibri"/>
+            <a:endParaRPr b="0" lang="en-IN" sz="3200" spc="-1" strike="noStrike">
+              <a:latin typeface="Arial"/>
             </a:endParaRPr>
           </a:p>
         </p:txBody>
@@ -2898,367 +1381,23 @@
         <p:spPr>
           <a:xfrm>
             <a:off x="1523880" y="1122480"/>
-            <a:ext cx="9143640" cy="2387160"/>
+            <a:ext cx="9143280" cy="2386800"/>
           </a:xfrm>
           <a:prstGeom prst="rect">
             <a:avLst/>
           </a:prstGeom>
         </p:spPr>
         <p:txBody>
-          <a:bodyPr anchor="b"/>
-          <a:p>
-            <a:pPr algn="ctr">
-              <a:lnSpc>
-                <a:spcPct val="90000"/>
-              </a:lnSpc>
-            </a:pPr>
+          <a:bodyPr lIns="0" rIns="0" tIns="0" bIns="0" anchor="ctr"/>
+          <a:p>
             <a:r>
-              <a:rPr b="0" lang="en-US" sz="6000" spc="-1" strike="noStrike">
-                <a:solidFill>
-                  <a:srgbClr val="000000"/>
-                </a:solidFill>
-                <a:latin typeface="Calibri Light"/>
+              <a:rPr b="0" lang="en-IN" sz="1800" spc="-1" strike="noStrike">
+                <a:latin typeface="Arial"/>
               </a:rPr>
-              <a:t>Click to edit Master title style</a:t>
+              <a:t>Click to edit the title text format</a:t>
             </a:r>
-            <a:endParaRPr b="0" lang="en-US" sz="6000" spc="-1" strike="noStrike">
-              <a:solidFill>
-                <a:srgbClr val="000000"/>
-              </a:solidFill>
-              <a:latin typeface="Calibri"/>
-            </a:endParaRPr>
-          </a:p>
-        </p:txBody>
-      </p:sp>
-      <p:sp>
-        <p:nvSpPr>
-          <p:cNvPr id="1" name="PlaceHolder 2"/>
-          <p:cNvSpPr>
-            <a:spLocks noGrp="1"/>
-          </p:cNvSpPr>
-          <p:nvPr>
-            <p:ph type="dt"/>
-          </p:nvPr>
-        </p:nvSpPr>
-        <p:spPr>
-          <a:xfrm>
-            <a:off x="838080" y="6356520"/>
-            <a:ext cx="2742840" cy="364680"/>
-          </a:xfrm>
-          <a:prstGeom prst="rect">
-            <a:avLst/>
-          </a:prstGeom>
-        </p:spPr>
-        <p:txBody>
-          <a:bodyPr anchor="ctr"/>
-          <a:p>
-            <a:pPr>
-              <a:lnSpc>
-                <a:spcPct val="100000"/>
-              </a:lnSpc>
-            </a:pPr>
-            <a:fld id="{686EE32B-B02C-45D3-A382-EAB7C09856F9}" type="datetime">
-              <a:rPr b="0" lang="en-IN" sz="1200" spc="-1" strike="noStrike">
-                <a:solidFill>
-                  <a:srgbClr val="8b8b8b"/>
-                </a:solidFill>
-                <a:latin typeface="Calibri"/>
-              </a:rPr>
-              <a:t>17/03/19</a:t>
-            </a:fld>
-            <a:endParaRPr b="0" lang="en-IN" sz="1200" spc="-1" strike="noStrike">
-              <a:latin typeface="Times New Roman"/>
-            </a:endParaRPr>
-          </a:p>
-        </p:txBody>
-      </p:sp>
-      <p:sp>
-        <p:nvSpPr>
-          <p:cNvPr id="2" name="PlaceHolder 3"/>
-          <p:cNvSpPr>
-            <a:spLocks noGrp="1"/>
-          </p:cNvSpPr>
-          <p:nvPr>
-            <p:ph type="ftr"/>
-          </p:nvPr>
-        </p:nvSpPr>
-        <p:spPr>
-          <a:xfrm>
-            <a:off x="4038480" y="6356520"/>
-            <a:ext cx="4114440" cy="364680"/>
-          </a:xfrm>
-          <a:prstGeom prst="rect">
-            <a:avLst/>
-          </a:prstGeom>
-        </p:spPr>
-        <p:txBody>
-          <a:bodyPr anchor="ctr"/>
-          <a:p>
-            <a:endParaRPr b="0" lang="en-IN" sz="2400" spc="-1" strike="noStrike">
-              <a:latin typeface="Times New Roman"/>
-            </a:endParaRPr>
-          </a:p>
-        </p:txBody>
-      </p:sp>
-      <p:sp>
-        <p:nvSpPr>
-          <p:cNvPr id="3" name="PlaceHolder 4"/>
-          <p:cNvSpPr>
-            <a:spLocks noGrp="1"/>
-          </p:cNvSpPr>
-          <p:nvPr>
-            <p:ph type="sldNum"/>
-          </p:nvPr>
-        </p:nvSpPr>
-        <p:spPr>
-          <a:xfrm>
-            <a:off x="8610480" y="6356520"/>
-            <a:ext cx="2742840" cy="364680"/>
-          </a:xfrm>
-          <a:prstGeom prst="rect">
-            <a:avLst/>
-          </a:prstGeom>
-        </p:spPr>
-        <p:txBody>
-          <a:bodyPr anchor="ctr"/>
-          <a:p>
-            <a:pPr algn="r">
-              <a:lnSpc>
-                <a:spcPct val="100000"/>
-              </a:lnSpc>
-            </a:pPr>
-            <a:fld id="{0DF30B1F-AC65-4C25-9EB9-AFE7ED7FFFB6}" type="slidenum">
-              <a:rPr b="0" lang="en-IN" sz="1200" spc="-1" strike="noStrike">
-                <a:solidFill>
-                  <a:srgbClr val="8b8b8b"/>
-                </a:solidFill>
-                <a:latin typeface="Calibri"/>
-              </a:rPr>
-              <a:t>&lt;number&gt;</a:t>
-            </a:fld>
-            <a:endParaRPr b="0" lang="en-IN" sz="1200" spc="-1" strike="noStrike">
-              <a:latin typeface="Times New Roman"/>
-            </a:endParaRPr>
-          </a:p>
-        </p:txBody>
-      </p:sp>
-      <p:sp>
-        <p:nvSpPr>
-          <p:cNvPr id="4" name="PlaceHolder 5"/>
-          <p:cNvSpPr>
-            <a:spLocks noGrp="1"/>
-          </p:cNvSpPr>
-          <p:nvPr>
-            <p:ph type="body"/>
-          </p:nvPr>
-        </p:nvSpPr>
-        <p:spPr>
-          <a:xfrm>
-            <a:off x="609480" y="1604520"/>
-            <a:ext cx="10972440" cy="3977280"/>
-          </a:xfrm>
-          <a:prstGeom prst="rect">
-            <a:avLst/>
-          </a:prstGeom>
-        </p:spPr>
-        <p:txBody>
-          <a:bodyPr lIns="0" rIns="0" tIns="0" bIns="0">
-            <a:normAutofit/>
-          </a:bodyPr>
-          <a:p>
-            <a:pPr marL="432000" indent="-324000">
-              <a:spcBef>
-                <a:spcPts val="1417"/>
-              </a:spcBef>
-              <a:buClr>
-                <a:srgbClr val="000000"/>
-              </a:buClr>
-              <a:buSzPct val="45000"/>
-              <a:buFont typeface="Wingdings" charset="2"/>
-              <a:buChar char=""/>
-            </a:pPr>
-            <a:r>
-              <a:rPr b="0" lang="en-US" sz="2800" spc="-1" strike="noStrike">
-                <a:solidFill>
-                  <a:srgbClr val="000000"/>
-                </a:solidFill>
-                <a:latin typeface="Calibri"/>
-              </a:rPr>
-              <a:t>Click to edit the outline text format</a:t>
-            </a:r>
-            <a:endParaRPr b="0" lang="en-US" sz="2800" spc="-1" strike="noStrike">
-              <a:solidFill>
-                <a:srgbClr val="000000"/>
-              </a:solidFill>
-              <a:latin typeface="Calibri"/>
-            </a:endParaRPr>
-          </a:p>
-          <a:p>
-            <a:pPr lvl="1" marL="864000" indent="-324000">
-              <a:spcBef>
-                <a:spcPts val="1134"/>
-              </a:spcBef>
-              <a:buClr>
-                <a:srgbClr val="000000"/>
-              </a:buClr>
-              <a:buSzPct val="75000"/>
-              <a:buFont typeface="Symbol" charset="2"/>
-              <a:buChar char=""/>
-            </a:pPr>
-            <a:r>
-              <a:rPr b="0" lang="en-US" sz="2000" spc="-1" strike="noStrike">
-                <a:solidFill>
-                  <a:srgbClr val="000000"/>
-                </a:solidFill>
-                <a:latin typeface="Calibri"/>
-              </a:rPr>
-              <a:t>Second Outline Level</a:t>
-            </a:r>
-            <a:endParaRPr b="0" lang="en-US" sz="2000" spc="-1" strike="noStrike">
-              <a:solidFill>
-                <a:srgbClr val="000000"/>
-              </a:solidFill>
-              <a:latin typeface="Calibri"/>
-            </a:endParaRPr>
-          </a:p>
-          <a:p>
-            <a:pPr lvl="2" marL="1296000" indent="-288000">
-              <a:spcBef>
-                <a:spcPts val="850"/>
-              </a:spcBef>
-              <a:buClr>
-                <a:srgbClr val="000000"/>
-              </a:buClr>
-              <a:buSzPct val="45000"/>
-              <a:buFont typeface="Wingdings" charset="2"/>
-              <a:buChar char=""/>
-            </a:pPr>
-            <a:r>
-              <a:rPr b="0" lang="en-US" sz="1800" spc="-1" strike="noStrike">
-                <a:solidFill>
-                  <a:srgbClr val="000000"/>
-                </a:solidFill>
-                <a:latin typeface="Calibri"/>
-              </a:rPr>
-              <a:t>Third Outline Level</a:t>
-            </a:r>
-            <a:endParaRPr b="0" lang="en-US" sz="1800" spc="-1" strike="noStrike">
-              <a:solidFill>
-                <a:srgbClr val="000000"/>
-              </a:solidFill>
-              <a:latin typeface="Calibri"/>
-            </a:endParaRPr>
-          </a:p>
-          <a:p>
-            <a:pPr lvl="3" marL="1728000" indent="-216000">
-              <a:spcBef>
-                <a:spcPts val="567"/>
-              </a:spcBef>
-              <a:buClr>
-                <a:srgbClr val="000000"/>
-              </a:buClr>
-              <a:buSzPct val="75000"/>
-              <a:buFont typeface="Symbol" charset="2"/>
-              <a:buChar char=""/>
-            </a:pPr>
-            <a:r>
-              <a:rPr b="0" lang="en-US" sz="1800" spc="-1" strike="noStrike">
-                <a:solidFill>
-                  <a:srgbClr val="000000"/>
-                </a:solidFill>
-                <a:latin typeface="Calibri"/>
-              </a:rPr>
-              <a:t>Fourth Outline Level</a:t>
-            </a:r>
-            <a:endParaRPr b="0" lang="en-US" sz="1800" spc="-1" strike="noStrike">
-              <a:solidFill>
-                <a:srgbClr val="000000"/>
-              </a:solidFill>
-              <a:latin typeface="Calibri"/>
-            </a:endParaRPr>
-          </a:p>
-          <a:p>
-            <a:pPr lvl="4" marL="2160000" indent="-216000">
-              <a:spcBef>
-                <a:spcPts val="283"/>
-              </a:spcBef>
-              <a:buClr>
-                <a:srgbClr val="000000"/>
-              </a:buClr>
-              <a:buSzPct val="45000"/>
-              <a:buFont typeface="Wingdings" charset="2"/>
-              <a:buChar char=""/>
-            </a:pPr>
-            <a:r>
-              <a:rPr b="0" lang="en-US" sz="2000" spc="-1" strike="noStrike">
-                <a:solidFill>
-                  <a:srgbClr val="000000"/>
-                </a:solidFill>
-                <a:latin typeface="Calibri"/>
-              </a:rPr>
-              <a:t>Fifth Outline Level</a:t>
-            </a:r>
-            <a:endParaRPr b="0" lang="en-US" sz="2000" spc="-1" strike="noStrike">
-              <a:solidFill>
-                <a:srgbClr val="000000"/>
-              </a:solidFill>
-              <a:latin typeface="Calibri"/>
-            </a:endParaRPr>
-          </a:p>
-          <a:p>
-            <a:pPr lvl="5" marL="2592000" indent="-216000">
-              <a:spcBef>
-                <a:spcPts val="283"/>
-              </a:spcBef>
-              <a:buClr>
-                <a:srgbClr val="000000"/>
-              </a:buClr>
-              <a:buSzPct val="45000"/>
-              <a:buFont typeface="Wingdings" charset="2"/>
-              <a:buChar char=""/>
-            </a:pPr>
-            <a:r>
-              <a:rPr b="0" lang="en-US" sz="2000" spc="-1" strike="noStrike">
-                <a:solidFill>
-                  <a:srgbClr val="000000"/>
-                </a:solidFill>
-                <a:latin typeface="Calibri"/>
-              </a:rPr>
-              <a:t>Sixth Outline Level</a:t>
-            </a:r>
-            <a:endParaRPr b="0" lang="en-US" sz="2000" spc="-1" strike="noStrike">
-              <a:solidFill>
-                <a:srgbClr val="000000"/>
-              </a:solidFill>
-              <a:latin typeface="Calibri"/>
-            </a:endParaRPr>
-          </a:p>
-          <a:p>
-            <a:pPr lvl="6" marL="3024000" indent="-216000">
-              <a:spcBef>
-                <a:spcPts val="283"/>
-              </a:spcBef>
-              <a:buClr>
-                <a:srgbClr val="000000"/>
-              </a:buClr>
-              <a:buSzPct val="45000"/>
-              <a:buFont typeface="Wingdings" charset="2"/>
-              <a:buChar char=""/>
-            </a:pPr>
-            <a:r>
-              <a:rPr b="0" lang="en-US" sz="2000" spc="-1" strike="noStrike">
-                <a:solidFill>
-                  <a:srgbClr val="000000"/>
-                </a:solidFill>
-                <a:latin typeface="Calibri"/>
-              </a:rPr>
-              <a:t>Seventh Outline Level</a:t>
-            </a:r>
-            <a:endParaRPr b="0" lang="en-US" sz="2000" spc="-1" strike="noStrike">
-              <a:solidFill>
-                <a:srgbClr val="000000"/>
-              </a:solidFill>
-              <a:latin typeface="Calibri"/>
+            <a:endParaRPr b="0" lang="en-IN" sz="1800" spc="-1" strike="noStrike">
+              <a:latin typeface="Arial"/>
             </a:endParaRPr>
           </a:p>
         </p:txBody>
@@ -3279,380 +1418,6 @@
     <p:sldLayoutId id="2147483658" r:id="rId11"/>
     <p:sldLayoutId id="2147483659" r:id="rId12"/>
     <p:sldLayoutId id="2147483660" r:id="rId13"/>
-  </p:sldLayoutIdLst>
-</p:sldMaster>
-</file>
-
-<file path=ppt/slideMasters/slideMaster2.xml><?xml version="1.0" encoding="utf-8"?>
-<p:sldMaster xmlns:a="http://schemas.openxmlformats.org/drawingml/2006/main" xmlns:p="http://schemas.openxmlformats.org/presentationml/2006/main" xmlns:r="http://schemas.openxmlformats.org/officeDocument/2006/relationships" xmlns:p14="http://schemas.microsoft.com/office/powerpoint/2010/main" xmlns:p15="http://schemas.microsoft.com/office/powerpoint/2012/main" xmlns:mc="http://schemas.openxmlformats.org/markup-compatibility/2006">
-  <p:cSld>
-    <p:bg>
-      <p:bgPr>
-        <a:solidFill>
-          <a:srgbClr val="ffffff"/>
-        </a:solidFill>
-      </p:bgPr>
-    </p:bg>
-    <p:spTree>
-      <p:nvGrpSpPr>
-        <p:cNvPr id="1" name=""/>
-        <p:cNvGrpSpPr/>
-        <p:nvPr/>
-      </p:nvGrpSpPr>
-      <p:grpSpPr>
-        <a:xfrm>
-          <a:off x="0" y="0"/>
-          <a:ext cx="0" cy="0"/>
-          <a:chOff x="0" y="0"/>
-          <a:chExt cx="0" cy="0"/>
-        </a:xfrm>
-      </p:grpSpPr>
-      <p:sp>
-        <p:nvSpPr>
-          <p:cNvPr id="41" name="PlaceHolder 1"/>
-          <p:cNvSpPr>
-            <a:spLocks noGrp="1"/>
-          </p:cNvSpPr>
-          <p:nvPr>
-            <p:ph type="title"/>
-          </p:nvPr>
-        </p:nvSpPr>
-        <p:spPr>
-          <a:xfrm>
-            <a:off x="838080" y="365040"/>
-            <a:ext cx="10515240" cy="1325160"/>
-          </a:xfrm>
-          <a:prstGeom prst="rect">
-            <a:avLst/>
-          </a:prstGeom>
-        </p:spPr>
-        <p:txBody>
-          <a:bodyPr anchor="ctr"/>
-          <a:p>
-            <a:pPr>
-              <a:lnSpc>
-                <a:spcPct val="90000"/>
-              </a:lnSpc>
-            </a:pPr>
-            <a:r>
-              <a:rPr b="0" lang="en-US" sz="4400" spc="-1" strike="noStrike">
-                <a:solidFill>
-                  <a:srgbClr val="000000"/>
-                </a:solidFill>
-                <a:latin typeface="Calibri Light"/>
-              </a:rPr>
-              <a:t>Click to edit Master title style</a:t>
-            </a:r>
-            <a:endParaRPr b="0" lang="en-US" sz="4400" spc="-1" strike="noStrike">
-              <a:solidFill>
-                <a:srgbClr val="000000"/>
-              </a:solidFill>
-              <a:latin typeface="Calibri"/>
-            </a:endParaRPr>
-          </a:p>
-        </p:txBody>
-      </p:sp>
-      <p:sp>
-        <p:nvSpPr>
-          <p:cNvPr id="42" name="PlaceHolder 2"/>
-          <p:cNvSpPr>
-            <a:spLocks noGrp="1"/>
-          </p:cNvSpPr>
-          <p:nvPr>
-            <p:ph type="body"/>
-          </p:nvPr>
-        </p:nvSpPr>
-        <p:spPr>
-          <a:xfrm>
-            <a:off x="838080" y="1825560"/>
-            <a:ext cx="10515240" cy="4350960"/>
-          </a:xfrm>
-          <a:prstGeom prst="rect">
-            <a:avLst/>
-          </a:prstGeom>
-        </p:spPr>
-        <p:txBody>
-          <a:bodyPr/>
-          <a:p>
-            <a:pPr marL="228600" indent="-228240">
-              <a:lnSpc>
-                <a:spcPct val="90000"/>
-              </a:lnSpc>
-              <a:spcBef>
-                <a:spcPts val="1001"/>
-              </a:spcBef>
-              <a:buClr>
-                <a:srgbClr val="000000"/>
-              </a:buClr>
-              <a:buFont typeface="Arial"/>
-              <a:buChar char="•"/>
-            </a:pPr>
-            <a:r>
-              <a:rPr b="0" lang="en-US" sz="2800" spc="-1" strike="noStrike">
-                <a:solidFill>
-                  <a:srgbClr val="000000"/>
-                </a:solidFill>
-                <a:latin typeface="Calibri"/>
-              </a:rPr>
-              <a:t>Edit Master text styles</a:t>
-            </a:r>
-            <a:endParaRPr b="0" lang="en-US" sz="2800" spc="-1" strike="noStrike">
-              <a:solidFill>
-                <a:srgbClr val="000000"/>
-              </a:solidFill>
-              <a:latin typeface="Calibri"/>
-            </a:endParaRPr>
-          </a:p>
-          <a:p>
-            <a:pPr lvl="1" marL="685800" indent="-228240">
-              <a:lnSpc>
-                <a:spcPct val="90000"/>
-              </a:lnSpc>
-              <a:spcBef>
-                <a:spcPts val="499"/>
-              </a:spcBef>
-              <a:buClr>
-                <a:srgbClr val="000000"/>
-              </a:buClr>
-              <a:buFont typeface="Arial"/>
-              <a:buChar char="•"/>
-            </a:pPr>
-            <a:r>
-              <a:rPr b="0" lang="en-US" sz="2400" spc="-1" strike="noStrike">
-                <a:solidFill>
-                  <a:srgbClr val="000000"/>
-                </a:solidFill>
-                <a:latin typeface="Calibri"/>
-              </a:rPr>
-              <a:t>Second level</a:t>
-            </a:r>
-            <a:endParaRPr b="0" lang="en-US" sz="2400" spc="-1" strike="noStrike">
-              <a:solidFill>
-                <a:srgbClr val="000000"/>
-              </a:solidFill>
-              <a:latin typeface="Calibri"/>
-            </a:endParaRPr>
-          </a:p>
-          <a:p>
-            <a:pPr lvl="2" marL="1143000" indent="-228240">
-              <a:lnSpc>
-                <a:spcPct val="90000"/>
-              </a:lnSpc>
-              <a:spcBef>
-                <a:spcPts val="499"/>
-              </a:spcBef>
-              <a:buClr>
-                <a:srgbClr val="000000"/>
-              </a:buClr>
-              <a:buFont typeface="Arial"/>
-              <a:buChar char="•"/>
-            </a:pPr>
-            <a:r>
-              <a:rPr b="0" lang="en-US" sz="2000" spc="-1" strike="noStrike">
-                <a:solidFill>
-                  <a:srgbClr val="000000"/>
-                </a:solidFill>
-                <a:latin typeface="Calibri"/>
-              </a:rPr>
-              <a:t>Third level</a:t>
-            </a:r>
-            <a:endParaRPr b="0" lang="en-US" sz="2000" spc="-1" strike="noStrike">
-              <a:solidFill>
-                <a:srgbClr val="000000"/>
-              </a:solidFill>
-              <a:latin typeface="Calibri"/>
-            </a:endParaRPr>
-          </a:p>
-          <a:p>
-            <a:pPr lvl="3" marL="1600200" indent="-228240">
-              <a:lnSpc>
-                <a:spcPct val="90000"/>
-              </a:lnSpc>
-              <a:spcBef>
-                <a:spcPts val="499"/>
-              </a:spcBef>
-              <a:buClr>
-                <a:srgbClr val="000000"/>
-              </a:buClr>
-              <a:buFont typeface="Arial"/>
-              <a:buChar char="•"/>
-            </a:pPr>
-            <a:r>
-              <a:rPr b="0" lang="en-US" sz="1800" spc="-1" strike="noStrike">
-                <a:solidFill>
-                  <a:srgbClr val="000000"/>
-                </a:solidFill>
-                <a:latin typeface="Calibri"/>
-              </a:rPr>
-              <a:t>Fourth level</a:t>
-            </a:r>
-            <a:endParaRPr b="0" lang="en-US" sz="1800" spc="-1" strike="noStrike">
-              <a:solidFill>
-                <a:srgbClr val="000000"/>
-              </a:solidFill>
-              <a:latin typeface="Calibri"/>
-            </a:endParaRPr>
-          </a:p>
-          <a:p>
-            <a:pPr lvl="4" marL="2057400" indent="-228240">
-              <a:lnSpc>
-                <a:spcPct val="90000"/>
-              </a:lnSpc>
-              <a:spcBef>
-                <a:spcPts val="499"/>
-              </a:spcBef>
-              <a:buClr>
-                <a:srgbClr val="000000"/>
-              </a:buClr>
-              <a:buFont typeface="Arial"/>
-              <a:buChar char="•"/>
-            </a:pPr>
-            <a:r>
-              <a:rPr b="0" lang="en-US" sz="1800" spc="-1" strike="noStrike">
-                <a:solidFill>
-                  <a:srgbClr val="000000"/>
-                </a:solidFill>
-                <a:latin typeface="Calibri"/>
-              </a:rPr>
-              <a:t>Fifth level</a:t>
-            </a:r>
-            <a:endParaRPr b="0" lang="en-US" sz="1800" spc="-1" strike="noStrike">
-              <a:solidFill>
-                <a:srgbClr val="000000"/>
-              </a:solidFill>
-              <a:latin typeface="Calibri"/>
-            </a:endParaRPr>
-          </a:p>
-        </p:txBody>
-      </p:sp>
-      <p:sp>
-        <p:nvSpPr>
-          <p:cNvPr id="43" name="PlaceHolder 3"/>
-          <p:cNvSpPr>
-            <a:spLocks noGrp="1"/>
-          </p:cNvSpPr>
-          <p:nvPr>
-            <p:ph type="dt"/>
-          </p:nvPr>
-        </p:nvSpPr>
-        <p:spPr>
-          <a:xfrm>
-            <a:off x="838080" y="6356520"/>
-            <a:ext cx="2742840" cy="364680"/>
-          </a:xfrm>
-          <a:prstGeom prst="rect">
-            <a:avLst/>
-          </a:prstGeom>
-        </p:spPr>
-        <p:txBody>
-          <a:bodyPr anchor="ctr"/>
-          <a:p>
-            <a:pPr>
-              <a:lnSpc>
-                <a:spcPct val="100000"/>
-              </a:lnSpc>
-            </a:pPr>
-            <a:fld id="{491E63FB-B0C9-4401-9036-B1D4E4A83C40}" type="datetime">
-              <a:rPr b="0" lang="en-IN" sz="1200" spc="-1" strike="noStrike">
-                <a:solidFill>
-                  <a:srgbClr val="8b8b8b"/>
-                </a:solidFill>
-                <a:latin typeface="Calibri"/>
-              </a:rPr>
-              <a:t>17/03/19</a:t>
-            </a:fld>
-            <a:endParaRPr b="0" lang="en-IN" sz="1200" spc="-1" strike="noStrike">
-              <a:latin typeface="Times New Roman"/>
-            </a:endParaRPr>
-          </a:p>
-        </p:txBody>
-      </p:sp>
-      <p:sp>
-        <p:nvSpPr>
-          <p:cNvPr id="44" name="PlaceHolder 4"/>
-          <p:cNvSpPr>
-            <a:spLocks noGrp="1"/>
-          </p:cNvSpPr>
-          <p:nvPr>
-            <p:ph type="ftr"/>
-          </p:nvPr>
-        </p:nvSpPr>
-        <p:spPr>
-          <a:xfrm>
-            <a:off x="4038480" y="6356520"/>
-            <a:ext cx="4114440" cy="364680"/>
-          </a:xfrm>
-          <a:prstGeom prst="rect">
-            <a:avLst/>
-          </a:prstGeom>
-        </p:spPr>
-        <p:txBody>
-          <a:bodyPr anchor="ctr"/>
-          <a:p>
-            <a:endParaRPr b="0" lang="en-IN" sz="2400" spc="-1" strike="noStrike">
-              <a:latin typeface="Times New Roman"/>
-            </a:endParaRPr>
-          </a:p>
-        </p:txBody>
-      </p:sp>
-      <p:sp>
-        <p:nvSpPr>
-          <p:cNvPr id="45" name="PlaceHolder 5"/>
-          <p:cNvSpPr>
-            <a:spLocks noGrp="1"/>
-          </p:cNvSpPr>
-          <p:nvPr>
-            <p:ph type="sldNum"/>
-          </p:nvPr>
-        </p:nvSpPr>
-        <p:spPr>
-          <a:xfrm>
-            <a:off x="8610480" y="6356520"/>
-            <a:ext cx="2742840" cy="364680"/>
-          </a:xfrm>
-          <a:prstGeom prst="rect">
-            <a:avLst/>
-          </a:prstGeom>
-        </p:spPr>
-        <p:txBody>
-          <a:bodyPr anchor="ctr"/>
-          <a:p>
-            <a:pPr algn="r">
-              <a:lnSpc>
-                <a:spcPct val="100000"/>
-              </a:lnSpc>
-            </a:pPr>
-            <a:fld id="{FE8A0F1B-D657-4704-AC6D-28B7B6FAB19A}" type="slidenum">
-              <a:rPr b="0" lang="en-IN" sz="1200" spc="-1" strike="noStrike">
-                <a:solidFill>
-                  <a:srgbClr val="8b8b8b"/>
-                </a:solidFill>
-                <a:latin typeface="Calibri"/>
-              </a:rPr>
-              <a:t>1</a:t>
-            </a:fld>
-            <a:endParaRPr b="0" lang="en-IN" sz="1200" spc="-1" strike="noStrike">
-              <a:latin typeface="Times New Roman"/>
-            </a:endParaRPr>
-          </a:p>
-        </p:txBody>
-      </p:sp>
-    </p:spTree>
-  </p:cSld>
-  <p:clrMap bg1="lt1" bg2="lt2" tx1="dk1" tx2="dk2" accent1="accent1" accent2="accent2" accent3="accent3" accent4="accent4" accent5="accent5" accent6="accent6" hlink="hlink" folHlink="folHlink"/>
-  <p:sldLayoutIdLst>
-    <p:sldLayoutId id="2147483662" r:id="rId2"/>
-    <p:sldLayoutId id="2147483663" r:id="rId3"/>
-    <p:sldLayoutId id="2147483664" r:id="rId4"/>
-    <p:sldLayoutId id="2147483665" r:id="rId5"/>
-    <p:sldLayoutId id="2147483666" r:id="rId6"/>
-    <p:sldLayoutId id="2147483667" r:id="rId7"/>
-    <p:sldLayoutId id="2147483668" r:id="rId8"/>
-    <p:sldLayoutId id="2147483669" r:id="rId9"/>
-    <p:sldLayoutId id="2147483670" r:id="rId10"/>
-    <p:sldLayoutId id="2147483671" r:id="rId11"/>
-    <p:sldLayoutId id="2147483672" r:id="rId12"/>
-    <p:sldLayoutId id="2147483673" r:id="rId13"/>
   </p:sldLayoutIdLst>
 </p:sldMaster>
 </file>
@@ -3676,14 +1441,14 @@
       </p:grpSpPr>
       <p:sp>
         <p:nvSpPr>
-          <p:cNvPr id="82" name="CustomShape 1"/>
+          <p:cNvPr id="37" name="CustomShape 1"/>
           <p:cNvSpPr/>
           <p:nvPr/>
         </p:nvSpPr>
         <p:spPr>
           <a:xfrm>
             <a:off x="4640040" y="1865160"/>
-            <a:ext cx="2862000" cy="453240"/>
+            <a:ext cx="2861640" cy="452880"/>
           </a:xfrm>
           <a:prstGeom prst="chevron">
             <a:avLst>
@@ -3717,6 +1482,7 @@
                   <a:srgbClr val="ffffff"/>
                 </a:solidFill>
                 <a:latin typeface="Calibri"/>
+                <a:ea typeface="DejaVu Sans"/>
               </a:rPr>
               <a:t>Solution</a:t>
             </a:r>
@@ -3728,14 +1494,14 @@
       </p:sp>
       <p:sp>
         <p:nvSpPr>
-          <p:cNvPr id="83" name="CustomShape 2"/>
+          <p:cNvPr id="38" name="CustomShape 2"/>
           <p:cNvSpPr/>
           <p:nvPr/>
         </p:nvSpPr>
         <p:spPr>
           <a:xfrm>
             <a:off x="889920" y="1865160"/>
-            <a:ext cx="2920680" cy="453240"/>
+            <a:ext cx="2920320" cy="452880"/>
           </a:xfrm>
           <a:prstGeom prst="homePlate">
             <a:avLst>
@@ -3769,6 +1535,7 @@
                   <a:srgbClr val="ffffff"/>
                 </a:solidFill>
                 <a:latin typeface="Calibri"/>
+                <a:ea typeface="DejaVu Sans"/>
               </a:rPr>
               <a:t>Issue</a:t>
             </a:r>
@@ -3780,14 +1547,14 @@
       </p:sp>
       <p:sp>
         <p:nvSpPr>
-          <p:cNvPr id="84" name="CustomShape 3"/>
+          <p:cNvPr id="39" name="CustomShape 3"/>
           <p:cNvSpPr/>
           <p:nvPr/>
         </p:nvSpPr>
         <p:spPr>
           <a:xfrm>
             <a:off x="950760" y="1887840"/>
-            <a:ext cx="321120" cy="340920"/>
+            <a:ext cx="320760" cy="340560"/>
           </a:xfrm>
           <a:custGeom>
             <a:avLst/>
@@ -4617,14 +2384,14 @@
       </p:sp>
       <p:sp>
         <p:nvSpPr>
-          <p:cNvPr id="85" name="CustomShape 4"/>
+          <p:cNvPr id="40" name="CustomShape 4"/>
           <p:cNvSpPr/>
           <p:nvPr/>
         </p:nvSpPr>
         <p:spPr>
           <a:xfrm>
             <a:off x="4980960" y="1880280"/>
-            <a:ext cx="369000" cy="385920"/>
+            <a:ext cx="368640" cy="385560"/>
           </a:xfrm>
           <a:custGeom>
             <a:avLst/>
@@ -5058,14 +2825,14 @@
       </p:sp>
       <p:sp>
         <p:nvSpPr>
-          <p:cNvPr id="86" name="CustomShape 5"/>
+          <p:cNvPr id="41" name="CustomShape 5"/>
           <p:cNvSpPr/>
           <p:nvPr/>
         </p:nvSpPr>
         <p:spPr>
           <a:xfrm>
             <a:off x="346680" y="2851920"/>
-            <a:ext cx="2697120" cy="2499840"/>
+            <a:ext cx="2696760" cy="2499480"/>
           </a:xfrm>
           <a:prstGeom prst="rect">
             <a:avLst/>
@@ -5084,14 +2851,14 @@
       </p:sp>
       <p:sp>
         <p:nvSpPr>
-          <p:cNvPr id="87" name="CustomShape 6"/>
+          <p:cNvPr id="42" name="CustomShape 6"/>
           <p:cNvSpPr/>
           <p:nvPr/>
         </p:nvSpPr>
         <p:spPr>
           <a:xfrm>
             <a:off x="4640040" y="2341080"/>
-            <a:ext cx="2923920" cy="3380040"/>
+            <a:ext cx="2923560" cy="3379680"/>
           </a:xfrm>
           <a:prstGeom prst="rect">
             <a:avLst/>
@@ -5110,7 +2877,7 @@
         <p:txBody>
           <a:bodyPr lIns="0" rIns="0" tIns="0" bIns="0"/>
           <a:p>
-            <a:pPr lvl="1" marL="399960" indent="-171000">
+            <a:pPr lvl="1" marL="399960" indent="-170640">
               <a:lnSpc>
                 <a:spcPts val="1301"/>
               </a:lnSpc>
@@ -5129,6 +2896,7 @@
                   <a:srgbClr val="2e75b6"/>
                 </a:solidFill>
                 <a:latin typeface="Calibri"/>
+                <a:ea typeface="DejaVu Sans"/>
               </a:rPr>
               <a:t>A zip folder of all the </a:t>
             </a:r>
@@ -5138,6 +2906,7 @@
                   <a:srgbClr val="2e75b6"/>
                 </a:solidFill>
                 <a:latin typeface="Calibri"/>
+                <a:ea typeface="DejaVu Sans"/>
               </a:rPr>
               <a:t>resumes and a job description</a:t>
             </a:r>
@@ -5147,6 +2916,7 @@
                   <a:srgbClr val="2e75b6"/>
                 </a:solidFill>
                 <a:latin typeface="Calibri"/>
+                <a:ea typeface="DejaVu Sans"/>
               </a:rPr>
               <a:t> are the required inputs from the user</a:t>
             </a:r>
@@ -5155,7 +2925,7 @@
             </a:endParaRPr>
           </a:p>
           <a:p>
-            <a:pPr lvl="1" marL="399960" indent="-171000">
+            <a:pPr lvl="1" marL="399960" indent="-170640">
               <a:lnSpc>
                 <a:spcPts val="1301"/>
               </a:lnSpc>
@@ -5174,6 +2944,7 @@
                   <a:srgbClr val="2e75b6"/>
                 </a:solidFill>
                 <a:latin typeface="Calibri"/>
+                <a:ea typeface="DejaVu Sans"/>
               </a:rPr>
               <a:t>Each resume will be analysed and scored on the basis of its </a:t>
             </a:r>
@@ -5183,6 +2954,7 @@
                   <a:srgbClr val="2e75b6"/>
                 </a:solidFill>
                 <a:latin typeface="Calibri"/>
+                <a:ea typeface="DejaVu Sans"/>
               </a:rPr>
               <a:t>similarity</a:t>
             </a:r>
@@ -5192,6 +2964,7 @@
                   <a:srgbClr val="2e75b6"/>
                 </a:solidFill>
                 <a:latin typeface="Calibri"/>
+                <a:ea typeface="DejaVu Sans"/>
               </a:rPr>
               <a:t> with the job description</a:t>
             </a:r>
@@ -5200,7 +2973,7 @@
             </a:endParaRPr>
           </a:p>
           <a:p>
-            <a:pPr lvl="1" marL="399960" indent="-171000">
+            <a:pPr lvl="1" marL="399960" indent="-170640">
               <a:lnSpc>
                 <a:spcPts val="1301"/>
               </a:lnSpc>
@@ -5219,6 +2992,7 @@
                   <a:srgbClr val="2e75b6"/>
                 </a:solidFill>
                 <a:latin typeface="Calibri"/>
+                <a:ea typeface="DejaVu Sans"/>
               </a:rPr>
               <a:t>The resumes will be displayed to the user in sorted order of their ranks</a:t>
             </a:r>
@@ -5227,7 +3001,7 @@
             </a:endParaRPr>
           </a:p>
           <a:p>
-            <a:pPr lvl="1" marL="399960" indent="-171000">
+            <a:pPr lvl="1" marL="399960" indent="-170640">
               <a:lnSpc>
                 <a:spcPts val="1301"/>
               </a:lnSpc>
@@ -5246,6 +3020,7 @@
                   <a:srgbClr val="2e75b6"/>
                 </a:solidFill>
                 <a:latin typeface="Calibri"/>
+                <a:ea typeface="DejaVu Sans"/>
               </a:rPr>
               <a:t>Additional filters such as number of resumes, education preference, etc. can be applied by the user for  more </a:t>
             </a:r>
@@ -5255,6 +3030,7 @@
                   <a:srgbClr val="2e75b6"/>
                 </a:solidFill>
                 <a:latin typeface="Calibri"/>
+                <a:ea typeface="DejaVu Sans"/>
               </a:rPr>
               <a:t>refined filtering</a:t>
             </a:r>
@@ -5266,14 +3042,14 @@
       </p:sp>
       <p:sp>
         <p:nvSpPr>
-          <p:cNvPr id="88" name="CustomShape 7"/>
+          <p:cNvPr id="43" name="CustomShape 7"/>
           <p:cNvSpPr/>
           <p:nvPr/>
         </p:nvSpPr>
         <p:spPr>
           <a:xfrm>
             <a:off x="889920" y="2341080"/>
-            <a:ext cx="2920680" cy="3109680"/>
+            <a:ext cx="2920320" cy="3109320"/>
           </a:xfrm>
           <a:prstGeom prst="rect">
             <a:avLst/>
@@ -5292,7 +3068,7 @@
         <p:txBody>
           <a:bodyPr lIns="0" rIns="0" tIns="0" bIns="0"/>
           <a:p>
-            <a:pPr lvl="1" marL="399960" indent="-171000">
+            <a:pPr lvl="1" marL="399960" indent="-170640">
               <a:lnSpc>
                 <a:spcPts val="1301"/>
               </a:lnSpc>
@@ -5311,6 +3087,7 @@
                   <a:srgbClr val="2e75b6"/>
                 </a:solidFill>
                 <a:latin typeface="Calibri"/>
+                <a:ea typeface="DejaVu Sans"/>
               </a:rPr>
               <a:t>Support for </a:t>
             </a:r>
@@ -5320,6 +3097,7 @@
                   <a:srgbClr val="2e75b6"/>
                 </a:solidFill>
                 <a:latin typeface="Calibri"/>
+                <a:ea typeface="DejaVu Sans"/>
               </a:rPr>
               <a:t>multiple file formats </a:t>
             </a:r>
@@ -5329,6 +3107,7 @@
                   <a:srgbClr val="2e75b6"/>
                 </a:solidFill>
                 <a:latin typeface="Calibri"/>
+                <a:ea typeface="DejaVu Sans"/>
               </a:rPr>
               <a:t>(for example image formats)</a:t>
             </a:r>
@@ -5337,7 +3116,7 @@
             </a:endParaRPr>
           </a:p>
           <a:p>
-            <a:pPr lvl="1" marL="399960" indent="-171000">
+            <a:pPr lvl="1" marL="399960" indent="-170640">
               <a:lnSpc>
                 <a:spcPts val="1301"/>
               </a:lnSpc>
@@ -5356,6 +3135,7 @@
                   <a:srgbClr val="2e75b6"/>
                 </a:solidFill>
                 <a:latin typeface="Calibri"/>
+                <a:ea typeface="DejaVu Sans"/>
               </a:rPr>
               <a:t>Building </a:t>
             </a:r>
@@ -5365,6 +3145,7 @@
                   <a:srgbClr val="2e75b6"/>
                 </a:solidFill>
                 <a:latin typeface="Calibri"/>
+                <a:ea typeface="DejaVu Sans"/>
               </a:rPr>
               <a:t>scalable and high performance architecture</a:t>
             </a:r>
@@ -5374,6 +3155,7 @@
                   <a:srgbClr val="2e75b6"/>
                 </a:solidFill>
                 <a:latin typeface="Calibri"/>
+                <a:ea typeface="DejaVu Sans"/>
               </a:rPr>
               <a:t> to support expansion</a:t>
             </a:r>
@@ -5382,7 +3164,7 @@
             </a:endParaRPr>
           </a:p>
           <a:p>
-            <a:pPr lvl="1" marL="399960" indent="-171000">
+            <a:pPr lvl="1" marL="399960" indent="-170640">
               <a:lnSpc>
                 <a:spcPts val="1301"/>
               </a:lnSpc>
@@ -5401,6 +3183,7 @@
                   <a:srgbClr val="2e75b6"/>
                 </a:solidFill>
                 <a:latin typeface="Calibri"/>
+                <a:ea typeface="DejaVu Sans"/>
               </a:rPr>
               <a:t>Scope of the data </a:t>
             </a:r>
@@ -5410,6 +3193,7 @@
                   <a:srgbClr val="2e75b6"/>
                 </a:solidFill>
                 <a:latin typeface="Calibri"/>
+                <a:ea typeface="DejaVu Sans"/>
               </a:rPr>
               <a:t>- some existing skills may be left unidentified, limited coverage can be an issue</a:t>
             </a:r>
@@ -5418,7 +3202,7 @@
             </a:endParaRPr>
           </a:p>
           <a:p>
-            <a:pPr lvl="1" marL="399960" indent="-171000">
+            <a:pPr lvl="1" marL="399960" indent="-170640">
               <a:lnSpc>
                 <a:spcPts val="1301"/>
               </a:lnSpc>
@@ -5437,6 +3221,7 @@
                   <a:srgbClr val="2e75b6"/>
                 </a:solidFill>
                 <a:latin typeface="Calibri"/>
+                <a:ea typeface="DejaVu Sans"/>
               </a:rPr>
               <a:t>Accommodating</a:t>
             </a:r>
@@ -5446,6 +3231,7 @@
                   <a:srgbClr val="2e75b6"/>
                 </a:solidFill>
                 <a:latin typeface="Calibri"/>
+                <a:ea typeface="DejaVu Sans"/>
               </a:rPr>
               <a:t> new skills </a:t>
             </a:r>
@@ -5455,6 +3241,7 @@
                   <a:srgbClr val="2e75b6"/>
                 </a:solidFill>
                 <a:latin typeface="Calibri"/>
+                <a:ea typeface="DejaVu Sans"/>
               </a:rPr>
               <a:t>with the growing and changing technologies is a challenge</a:t>
             </a:r>
@@ -5463,7 +3250,7 @@
             </a:endParaRPr>
           </a:p>
           <a:p>
-            <a:pPr lvl="1" marL="399960" indent="-171000">
+            <a:pPr lvl="1" marL="399960" indent="-170640">
               <a:lnSpc>
                 <a:spcPts val="1301"/>
               </a:lnSpc>
@@ -5482,6 +3269,7 @@
                   <a:srgbClr val="2e75b6"/>
                 </a:solidFill>
                 <a:latin typeface="Calibri"/>
+                <a:ea typeface="DejaVu Sans"/>
               </a:rPr>
               <a:t>Building a </a:t>
             </a:r>
@@ -5491,6 +3279,7 @@
                   <a:srgbClr val="2e75b6"/>
                 </a:solidFill>
                 <a:latin typeface="Calibri"/>
+                <a:ea typeface="DejaVu Sans"/>
               </a:rPr>
               <a:t>robust system </a:t>
             </a:r>
@@ -5500,6 +3289,7 @@
                   <a:srgbClr val="2e75b6"/>
                 </a:solidFill>
                 <a:latin typeface="Calibri"/>
+                <a:ea typeface="DejaVu Sans"/>
               </a:rPr>
               <a:t>with high accuracy and efficiency (to be improved in future versions)</a:t>
             </a:r>
@@ -5511,14 +3301,14 @@
       </p:sp>
       <p:sp>
         <p:nvSpPr>
-          <p:cNvPr id="89" name="CustomShape 8"/>
+          <p:cNvPr id="44" name="CustomShape 8"/>
           <p:cNvSpPr/>
           <p:nvPr/>
         </p:nvSpPr>
         <p:spPr>
           <a:xfrm>
             <a:off x="258840" y="809640"/>
-            <a:ext cx="11367000" cy="705960"/>
+            <a:ext cx="11366640" cy="705600"/>
           </a:xfrm>
           <a:prstGeom prst="rect">
             <a:avLst/>
@@ -5535,7 +3325,7 @@
           <a:fontRef idx="minor"/>
         </p:style>
         <p:txBody>
-          <a:bodyPr rIns="0"/>
+          <a:bodyPr lIns="90000" rIns="0" tIns="45000" bIns="45000"/>
           <a:p>
             <a:pPr>
               <a:lnSpc>
@@ -5548,6 +3338,7 @@
                   <a:srgbClr val="2e75b6"/>
                 </a:solidFill>
                 <a:latin typeface="Calibri"/>
+                <a:ea typeface="DejaVu Sans"/>
               </a:rPr>
               <a:t>The world has seen a boom in employment opportunities, due to which big companies tend to receive huge amounts of applications on a daily basis. Job applications are usually accompanied with resumes/CVs. This creates a serious problem for the company to allocate human man power to filter through the resumes to choose desirable candidates. Our resume filtering application will sort resumes based on their relevance with the given job profile using a cognitive automated approach.</a:t>
             </a:r>
@@ -5559,14 +3350,14 @@
       </p:sp>
       <p:sp>
         <p:nvSpPr>
-          <p:cNvPr id="90" name="CustomShape 9"/>
+          <p:cNvPr id="45" name="CustomShape 9"/>
           <p:cNvSpPr/>
           <p:nvPr/>
         </p:nvSpPr>
         <p:spPr>
           <a:xfrm>
             <a:off x="357480" y="424440"/>
-            <a:ext cx="11381400" cy="298800"/>
+            <a:ext cx="11381040" cy="298440"/>
           </a:xfrm>
           <a:prstGeom prst="rect">
             <a:avLst/>
@@ -5598,6 +3389,7 @@
                   <a:srgbClr val="ffffff"/>
                 </a:solidFill>
                 <a:latin typeface="Calibri"/>
+                <a:ea typeface="DejaVu Sans"/>
               </a:rPr>
               <a:t>Business Problem</a:t>
             </a:r>
@@ -5609,14 +3401,14 @@
       </p:sp>
       <p:sp>
         <p:nvSpPr>
-          <p:cNvPr id="91" name="CustomShape 10"/>
+          <p:cNvPr id="46" name="CustomShape 10"/>
           <p:cNvSpPr/>
           <p:nvPr/>
         </p:nvSpPr>
         <p:spPr>
           <a:xfrm>
             <a:off x="8331120" y="1889280"/>
-            <a:ext cx="2923920" cy="453240"/>
+            <a:ext cx="2923560" cy="452880"/>
           </a:xfrm>
           <a:prstGeom prst="chevron">
             <a:avLst>
@@ -5650,6 +3442,7 @@
                   <a:srgbClr val="ffffff"/>
                 </a:solidFill>
                 <a:latin typeface="Calibri"/>
+                <a:ea typeface="DejaVu Sans"/>
               </a:rPr>
               <a:t>Impact</a:t>
             </a:r>
@@ -5661,14 +3454,14 @@
       </p:sp>
       <p:sp>
         <p:nvSpPr>
-          <p:cNvPr id="92" name="CustomShape 11"/>
+          <p:cNvPr id="47" name="CustomShape 11"/>
           <p:cNvSpPr/>
           <p:nvPr/>
         </p:nvSpPr>
         <p:spPr>
           <a:xfrm>
             <a:off x="8726040" y="1911600"/>
-            <a:ext cx="347400" cy="430920"/>
+            <a:ext cx="347040" cy="430560"/>
           </a:xfrm>
           <a:custGeom>
             <a:avLst/>
@@ -6211,14 +4004,14 @@
       </p:sp>
       <p:sp>
         <p:nvSpPr>
-          <p:cNvPr id="93" name="CustomShape 12"/>
+          <p:cNvPr id="48" name="CustomShape 12"/>
           <p:cNvSpPr/>
           <p:nvPr/>
         </p:nvSpPr>
         <p:spPr>
           <a:xfrm>
             <a:off x="8331120" y="2364840"/>
-            <a:ext cx="2697120" cy="3687120"/>
+            <a:ext cx="2696760" cy="3686760"/>
           </a:xfrm>
           <a:prstGeom prst="rect">
             <a:avLst/>
@@ -6237,7 +4030,7 @@
         <p:txBody>
           <a:bodyPr lIns="0" rIns="0" tIns="0" bIns="0"/>
           <a:p>
-            <a:pPr lvl="1" marL="399960" indent="-171000">
+            <a:pPr lvl="1" marL="399960" indent="-170640">
               <a:lnSpc>
                 <a:spcPts val="1301"/>
               </a:lnSpc>
@@ -6257,6 +4050,7 @@
                   <a:srgbClr val="2e75b6"/>
                 </a:solidFill>
                 <a:latin typeface="Calibri"/>
+                <a:ea typeface="DejaVu Sans"/>
               </a:rPr>
               <a:t>Improved utilisation of </a:t>
             </a:r>
@@ -6266,6 +4060,7 @@
                   <a:srgbClr val="2e75b6"/>
                 </a:solidFill>
                 <a:latin typeface="Calibri"/>
+                <a:ea typeface="DejaVu Sans"/>
               </a:rPr>
               <a:t>money, time, and resources</a:t>
             </a:r>
@@ -6275,6 +4070,7 @@
                   <a:srgbClr val="2e75b6"/>
                 </a:solidFill>
                 <a:latin typeface="Calibri"/>
+                <a:ea typeface="DejaVu Sans"/>
               </a:rPr>
               <a:t> for business users</a:t>
             </a:r>
@@ -6283,7 +4079,7 @@
             </a:endParaRPr>
           </a:p>
           <a:p>
-            <a:pPr lvl="1" marL="399960" indent="-171000">
+            <a:pPr lvl="1" marL="399960" indent="-170640">
               <a:lnSpc>
                 <a:spcPts val="1301"/>
               </a:lnSpc>
@@ -6303,6 +4099,7 @@
                   <a:srgbClr val="2e75b6"/>
                 </a:solidFill>
                 <a:latin typeface="Calibri"/>
+                <a:ea typeface="DejaVu Sans"/>
               </a:rPr>
               <a:t>No need to have a database for storage, which results in </a:t>
             </a:r>
@@ -6312,6 +4109,7 @@
                   <a:srgbClr val="2e75b6"/>
                 </a:solidFill>
                 <a:latin typeface="Calibri"/>
+                <a:ea typeface="DejaVu Sans"/>
               </a:rPr>
               <a:t>no operation /maintenance costs</a:t>
             </a:r>
@@ -6320,7 +4118,7 @@
             </a:endParaRPr>
           </a:p>
           <a:p>
-            <a:pPr lvl="1" marL="399960" indent="-171000">
+            <a:pPr lvl="1" marL="399960" indent="-170640">
               <a:lnSpc>
                 <a:spcPts val="1301"/>
               </a:lnSpc>
@@ -6340,6 +4138,7 @@
                   <a:srgbClr val="2e75b6"/>
                 </a:solidFill>
                 <a:latin typeface="Calibri"/>
+                <a:ea typeface="DejaVu Sans"/>
               </a:rPr>
               <a:t>Use of only open source technologies does not incur any software/ licensing costs </a:t>
             </a:r>
@@ -6349,6 +4148,7 @@
                   <a:srgbClr val="2e75b6"/>
                 </a:solidFill>
                 <a:latin typeface="Calibri"/>
+                <a:ea typeface="DejaVu Sans"/>
               </a:rPr>
               <a:t>(FREE TO USE SOFTWARE)</a:t>
             </a:r>
@@ -6357,7 +4157,7 @@
             </a:endParaRPr>
           </a:p>
           <a:p>
-            <a:pPr lvl="1" marL="399960" indent="-171000">
+            <a:pPr lvl="1" marL="399960" indent="-170640">
               <a:lnSpc>
                 <a:spcPts val="1301"/>
               </a:lnSpc>
@@ -6377,6 +4177,7 @@
                   <a:srgbClr val="2e75b6"/>
                 </a:solidFill>
                 <a:latin typeface="Calibri"/>
+                <a:ea typeface="DejaVu Sans"/>
               </a:rPr>
               <a:t>Enabled self-service reporting to support </a:t>
             </a:r>
@@ -6386,6 +4187,7 @@
                   <a:srgbClr val="2e75b6"/>
                 </a:solidFill>
                 <a:latin typeface="Calibri"/>
+                <a:ea typeface="DejaVu Sans"/>
               </a:rPr>
               <a:t>reports for strategic and tactical decision making</a:t>
             </a:r>
@@ -6395,10 +4197,73 @@
                   <a:srgbClr val="2e75b6"/>
                 </a:solidFill>
                 <a:latin typeface="Calibri"/>
+                <a:ea typeface="DejaVu Sans"/>
               </a:rPr>
               <a:t> by business users</a:t>
             </a:r>
             <a:endParaRPr b="0" lang="en-IN" sz="1200" spc="-1" strike="noStrike">
+              <a:latin typeface="Arial"/>
+            </a:endParaRPr>
+          </a:p>
+        </p:txBody>
+      </p:sp>
+      <p:sp>
+        <p:nvSpPr>
+          <p:cNvPr id="49" name="TextShape 13"/>
+          <p:cNvSpPr txBox="1"/>
+          <p:nvPr/>
+        </p:nvSpPr>
+        <p:spPr>
+          <a:xfrm>
+            <a:off x="1800000" y="5733720"/>
+            <a:ext cx="8856000" cy="602280"/>
+          </a:xfrm>
+          <a:prstGeom prst="rect">
+            <a:avLst/>
+          </a:prstGeom>
+          <a:noFill/>
+          <a:ln>
+            <a:noFill/>
+          </a:ln>
+        </p:spPr>
+        <p:txBody>
+          <a:bodyPr lIns="90000" rIns="90000" tIns="45000" bIns="45000"/>
+          <a:p>
+            <a:pPr>
+              <a:lnSpc>
+                <a:spcPts val="1301"/>
+              </a:lnSpc>
+              <a:spcBef>
+                <a:spcPts val="479"/>
+              </a:spcBef>
+            </a:pPr>
+            <a:r>
+              <a:rPr b="1" lang="en-IN" sz="1200" spc="-1" strike="noStrike">
+                <a:solidFill>
+                  <a:srgbClr val="2e75b6"/>
+                </a:solidFill>
+                <a:latin typeface="Calibri"/>
+                <a:ea typeface="DejaVu Sans"/>
+              </a:rPr>
+              <a:t>The</a:t>
+            </a:r>
+            <a:r>
+              <a:rPr b="1" lang="en-IN" sz="1800" spc="-1" strike="noStrike">
+                <a:latin typeface="Arial"/>
+              </a:rPr>
+              <a:t> </a:t>
+            </a:r>
+            <a:r>
+              <a:rPr b="1" lang="en-IN" sz="1200" spc="-1" strike="noStrike">
+                <a:solidFill>
+                  <a:srgbClr val="2e75b6"/>
+                </a:solidFill>
+                <a:latin typeface="Calibri"/>
+                <a:ea typeface="DejaVu Sans"/>
+              </a:rPr>
+              <a:t>design and architecture doc and the data model pdf has been attached along with this ppt</a:t>
+            </a:r>
+            <a:endParaRPr b="1" lang="en-IN" sz="1200" spc="-1" strike="noStrike">
               <a:latin typeface="Arial"/>
             </a:endParaRPr>
           </a:p>
@@ -6657,227 +4522,4 @@
     </a:fmtScheme>
   </a:themeElements>
 </a:theme>
-</file>
-
-<file path=ppt/theme/theme2.xml><?xml version="1.0" encoding="utf-8"?>
-<a:theme xmlns:a="http://schemas.openxmlformats.org/drawingml/2006/main" name="Office Theme">
-  <a:themeElements>
-    <a:clrScheme name="Office">
-      <a:dk1>
-        <a:sysClr val="windowText" lastClr="000000"/>
-      </a:dk1>
-      <a:lt1>
-        <a:sysClr val="window" lastClr="FFFFFF"/>
-      </a:lt1>
-      <a:dk2>
-        <a:srgbClr val="44546a"/>
-      </a:dk2>
-      <a:lt2>
-        <a:srgbClr val="e7e6e6"/>
-      </a:lt2>
-      <a:accent1>
-        <a:srgbClr val="5b9bd5"/>
-      </a:accent1>
-      <a:accent2>
-        <a:srgbClr val="ed7d31"/>
-      </a:accent2>
-      <a:accent3>
-        <a:srgbClr val="a5a5a5"/>
-      </a:accent3>
-      <a:accent4>
-        <a:srgbClr val="ffc000"/>
-      </a:accent4>
-      <a:accent5>
-        <a:srgbClr val="4472c4"/>
-      </a:accent5>
-      <a:accent6>
-        <a:srgbClr val="70ad47"/>
-      </a:accent6>
-      <a:hlink>
-        <a:srgbClr val="0563c1"/>
-      </a:hlink>
-      <a:folHlink>
-        <a:srgbClr val="954f72"/>
-      </a:folHlink>
-    </a:clrScheme>
-    <a:fontScheme name="Office">
-      <a:majorFont>
-        <a:latin typeface="Arial"/>
-        <a:ea typeface="DejaVu Sans"/>
-        <a:cs typeface="DejaVu Sans"/>
-      </a:majorFont>
-      <a:minorFont>
-        <a:latin typeface="Arial"/>
-        <a:ea typeface="DejaVu Sans"/>
-        <a:cs typeface="DejaVu Sans"/>
-      </a:minorFont>
-    </a:fontScheme>
-    <a:fmtScheme name="Office">
-      <a:fillStyleLst>
-        <a:solidFill>
-          <a:schemeClr val="phClr"/>
-        </a:solidFill>
-        <a:gradFill rotWithShape="1">
-          <a:gsLst>
-            <a:gs pos="0">
-              <a:schemeClr val="phClr">
-                <a:tint val="50000"/>
-                <a:satMod val="300000"/>
-              </a:schemeClr>
-            </a:gs>
-            <a:gs pos="35000">
-              <a:schemeClr val="phClr">
-                <a:tint val="37000"/>
-                <a:satMod val="300000"/>
-              </a:schemeClr>
-            </a:gs>
-            <a:gs pos="100000">
-              <a:schemeClr val="phClr">
-                <a:tint val="15000"/>
-                <a:satMod val="350000"/>
-              </a:schemeClr>
-            </a:gs>
-          </a:gsLst>
-          <a:lin ang="16200000" scaled="1"/>
-        </a:gradFill>
-        <a:gradFill rotWithShape="1">
-          <a:gsLst>
-            <a:gs pos="0">
-              <a:schemeClr val="phClr">
-                <a:shade val="51000"/>
-                <a:satMod val="130000"/>
-              </a:schemeClr>
-            </a:gs>
-            <a:gs pos="80000">
-              <a:schemeClr val="phClr">
-                <a:shade val="93000"/>
-                <a:satMod val="130000"/>
-              </a:schemeClr>
-            </a:gs>
-            <a:gs pos="100000">
-              <a:schemeClr val="phClr">
-                <a:shade val="94000"/>
-                <a:satMod val="135000"/>
-              </a:schemeClr>
-            </a:gs>
-          </a:gsLst>
-          <a:lin ang="16200000" scaled="0"/>
-        </a:gradFill>
-      </a:fillStyleLst>
-      <a:lnStyleLst>
-        <a:ln w="9525" cap="flat" cmpd="sng" algn="ctr">
-          <a:solidFill>
-            <a:schemeClr val="phClr">
-              <a:shade val="95000"/>
-              <a:satMod val="105000"/>
-            </a:schemeClr>
-          </a:solidFill>
-          <a:prstDash val="solid"/>
-        </a:ln>
-        <a:ln w="25400" cap="flat" cmpd="sng" algn="ctr">
-          <a:solidFill>
-            <a:schemeClr val="phClr"/>
-          </a:solidFill>
-          <a:prstDash val="solid"/>
-        </a:ln>
-        <a:ln w="38100" cap="flat" cmpd="sng" algn="ctr">
-          <a:solidFill>
-            <a:schemeClr val="phClr"/>
-          </a:solidFill>
-          <a:prstDash val="solid"/>
-        </a:ln>
-      </a:lnStyleLst>
-      <a:effectStyleLst>
-        <a:effectStyle>
-          <a:effectLst>
-            <a:outerShdw blurRad="40000" dist="20000" dir="5400000" rotWithShape="0">
-              <a:srgbClr val="000000">
-                <a:alpha val="38000"/>
-              </a:srgbClr>
-            </a:outerShdw>
-          </a:effectLst>
-        </a:effectStyle>
-        <a:effectStyle>
-          <a:effectLst>
-            <a:outerShdw blurRad="40000" dist="23000" dir="5400000" rotWithShape="0">
-              <a:srgbClr val="000000">
-                <a:alpha val="35000"/>
-              </a:srgbClr>
-            </a:outerShdw>
-          </a:effectLst>
-        </a:effectStyle>
-        <a:effectStyle>
-          <a:effectLst>
-            <a:outerShdw blurRad="40000" dist="23000" dir="5400000" rotWithShape="0">
-              <a:srgbClr val="000000">
-                <a:alpha val="35000"/>
-              </a:srgbClr>
-            </a:outerShdw>
-          </a:effectLst>
-          <a:scene3d>
-            <a:camera prst="orthographicFront">
-              <a:rot lat="0" lon="0" rev="0"/>
-            </a:camera>
-            <a:lightRig rig="threePt" dir="t">
-              <a:rot lat="0" lon="0" rev="1200000"/>
-            </a:lightRig>
-          </a:scene3d>
-          <a:sp3d>
-            <a:bevelT w="63500" h="25400"/>
-          </a:sp3d>
-        </a:effectStyle>
-      </a:effectStyleLst>
-      <a:bgFillStyleLst>
-        <a:solidFill>
-          <a:schemeClr val="phClr"/>
-        </a:solidFill>
-        <a:gradFill rotWithShape="1">
-          <a:gsLst>
-            <a:gs pos="0">
-              <a:schemeClr val="phClr">
-                <a:tint val="40000"/>
-                <a:satMod val="350000"/>
-              </a:schemeClr>
-            </a:gs>
-            <a:gs pos="40000">
-              <a:schemeClr val="phClr">
-                <a:tint val="45000"/>
-                <a:shade val="99000"/>
-                <a:satMod val="350000"/>
-              </a:schemeClr>
-            </a:gs>
-            <a:gs pos="100000">
-              <a:schemeClr val="phClr">
-                <a:shade val="20000"/>
-                <a:satMod val="255000"/>
-              </a:schemeClr>
-            </a:gs>
-          </a:gsLst>
-          <a:path path="circle">
-            <a:fillToRect l="50000" t="-80000" r="50000" b="180000"/>
-          </a:path>
-        </a:gradFill>
-        <a:gradFill rotWithShape="1">
-          <a:gsLst>
-            <a:gs pos="0">
-              <a:schemeClr val="phClr">
-                <a:tint val="80000"/>
-                <a:satMod val="300000"/>
-              </a:schemeClr>
-            </a:gs>
-            <a:gs pos="100000">
-              <a:schemeClr val="phClr">
-                <a:shade val="30000"/>
-                <a:satMod val="200000"/>
-              </a:schemeClr>
-            </a:gs>
-          </a:gsLst>
-          <a:path path="circle">
-            <a:fillToRect l="50000" t="50000" r="50000" b="50000"/>
-          </a:path>
-        </a:gradFill>
-      </a:bgFillStyleLst>
-    </a:fmtScheme>
-  </a:themeElements>
-</a:theme>
 </file>
</xml_diff>